<commit_message>
forgot to add two files with last commit
</commit_message>
<xml_diff>
--- a/gametheoryfigures.pptx
+++ b/gametheoryfigures.pptx
@@ -6,7 +6,10 @@
   </p:sldMasterIdLst>
   <p:sldIdLst>
     <p:sldId id="256" r:id="rId2"/>
-    <p:sldId id="257" r:id="rId3"/>
+    <p:sldId id="260" r:id="rId3"/>
+    <p:sldId id="257" r:id="rId4"/>
+    <p:sldId id="258" r:id="rId5"/>
+    <p:sldId id="259" r:id="rId6"/>
   </p:sldIdLst>
   <p:sldSz cx="9144000" cy="6858000" type="screen4x3"/>
   <p:notesSz cx="6858000" cy="9144000"/>
@@ -289,7 +292,8 @@
           <a:p>
             <a:fld id="{3E8967D4-FF48-447B-9DB9-858742D691FC}" type="datetimeFigureOut">
               <a:rPr lang="en-US" smtClean="0"/>
-              <a:t>9/6/2011</a:t>
+              <a:pPr/>
+              <a:t>12/9/2011</a:t>
             </a:fld>
             <a:endParaRPr lang="en-US"/>
           </a:p>
@@ -331,6 +335,7 @@
           <a:p>
             <a:fld id="{C888357B-4C21-44B0-98CD-1548C9C68A62}" type="slidenum">
               <a:rPr lang="en-US" smtClean="0"/>
+              <a:pPr/>
               <a:t>‹#›</a:t>
             </a:fld>
             <a:endParaRPr lang="en-US"/>
@@ -340,7 +345,7 @@
     </p:spTree>
     <p:extLst>
       <p:ext uri="{BB962C8B-B14F-4D97-AF65-F5344CB8AC3E}">
-        <p14:creationId xmlns:p14="http://schemas.microsoft.com/office/powerpoint/2010/main" val="2607822030"/>
+        <p14:creationId xmlns:p14="http://schemas.microsoft.com/office/powerpoint/2010/main" xmlns="" val="2607822030"/>
       </p:ext>
     </p:extLst>
   </p:cSld>
@@ -459,7 +464,8 @@
           <a:p>
             <a:fld id="{3E8967D4-FF48-447B-9DB9-858742D691FC}" type="datetimeFigureOut">
               <a:rPr lang="en-US" smtClean="0"/>
-              <a:t>9/6/2011</a:t>
+              <a:pPr/>
+              <a:t>12/9/2011</a:t>
             </a:fld>
             <a:endParaRPr lang="en-US"/>
           </a:p>
@@ -501,6 +507,7 @@
           <a:p>
             <a:fld id="{C888357B-4C21-44B0-98CD-1548C9C68A62}" type="slidenum">
               <a:rPr lang="en-US" smtClean="0"/>
+              <a:pPr/>
               <a:t>‹#›</a:t>
             </a:fld>
             <a:endParaRPr lang="en-US"/>
@@ -510,7 +517,7 @@
     </p:spTree>
     <p:extLst>
       <p:ext uri="{BB962C8B-B14F-4D97-AF65-F5344CB8AC3E}">
-        <p14:creationId xmlns:p14="http://schemas.microsoft.com/office/powerpoint/2010/main" val="1851855191"/>
+        <p14:creationId xmlns:p14="http://schemas.microsoft.com/office/powerpoint/2010/main" xmlns="" val="1851855191"/>
       </p:ext>
     </p:extLst>
   </p:cSld>
@@ -639,7 +646,8 @@
           <a:p>
             <a:fld id="{3E8967D4-FF48-447B-9DB9-858742D691FC}" type="datetimeFigureOut">
               <a:rPr lang="en-US" smtClean="0"/>
-              <a:t>9/6/2011</a:t>
+              <a:pPr/>
+              <a:t>12/9/2011</a:t>
             </a:fld>
             <a:endParaRPr lang="en-US"/>
           </a:p>
@@ -681,6 +689,7 @@
           <a:p>
             <a:fld id="{C888357B-4C21-44B0-98CD-1548C9C68A62}" type="slidenum">
               <a:rPr lang="en-US" smtClean="0"/>
+              <a:pPr/>
               <a:t>‹#›</a:t>
             </a:fld>
             <a:endParaRPr lang="en-US"/>
@@ -690,7 +699,7 @@
     </p:spTree>
     <p:extLst>
       <p:ext uri="{BB962C8B-B14F-4D97-AF65-F5344CB8AC3E}">
-        <p14:creationId xmlns:p14="http://schemas.microsoft.com/office/powerpoint/2010/main" val="4179941889"/>
+        <p14:creationId xmlns:p14="http://schemas.microsoft.com/office/powerpoint/2010/main" xmlns="" val="4179941889"/>
       </p:ext>
     </p:extLst>
   </p:cSld>
@@ -809,7 +818,8 @@
           <a:p>
             <a:fld id="{3E8967D4-FF48-447B-9DB9-858742D691FC}" type="datetimeFigureOut">
               <a:rPr lang="en-US" smtClean="0"/>
-              <a:t>9/6/2011</a:t>
+              <a:pPr/>
+              <a:t>12/9/2011</a:t>
             </a:fld>
             <a:endParaRPr lang="en-US"/>
           </a:p>
@@ -851,6 +861,7 @@
           <a:p>
             <a:fld id="{C888357B-4C21-44B0-98CD-1548C9C68A62}" type="slidenum">
               <a:rPr lang="en-US" smtClean="0"/>
+              <a:pPr/>
               <a:t>‹#›</a:t>
             </a:fld>
             <a:endParaRPr lang="en-US"/>
@@ -860,7 +871,7 @@
     </p:spTree>
     <p:extLst>
       <p:ext uri="{BB962C8B-B14F-4D97-AF65-F5344CB8AC3E}">
-        <p14:creationId xmlns:p14="http://schemas.microsoft.com/office/powerpoint/2010/main" val="1851933190"/>
+        <p14:creationId xmlns:p14="http://schemas.microsoft.com/office/powerpoint/2010/main" xmlns="" val="1851933190"/>
       </p:ext>
     </p:extLst>
   </p:cSld>
@@ -1055,7 +1066,8 @@
           <a:p>
             <a:fld id="{3E8967D4-FF48-447B-9DB9-858742D691FC}" type="datetimeFigureOut">
               <a:rPr lang="en-US" smtClean="0"/>
-              <a:t>9/6/2011</a:t>
+              <a:pPr/>
+              <a:t>12/9/2011</a:t>
             </a:fld>
             <a:endParaRPr lang="en-US"/>
           </a:p>
@@ -1097,6 +1109,7 @@
           <a:p>
             <a:fld id="{C888357B-4C21-44B0-98CD-1548C9C68A62}" type="slidenum">
               <a:rPr lang="en-US" smtClean="0"/>
+              <a:pPr/>
               <a:t>‹#›</a:t>
             </a:fld>
             <a:endParaRPr lang="en-US"/>
@@ -1106,7 +1119,7 @@
     </p:spTree>
     <p:extLst>
       <p:ext uri="{BB962C8B-B14F-4D97-AF65-F5344CB8AC3E}">
-        <p14:creationId xmlns:p14="http://schemas.microsoft.com/office/powerpoint/2010/main" val="3300295364"/>
+        <p14:creationId xmlns:p14="http://schemas.microsoft.com/office/powerpoint/2010/main" xmlns="" val="3300295364"/>
       </p:ext>
     </p:extLst>
   </p:cSld>
@@ -1343,7 +1356,8 @@
           <a:p>
             <a:fld id="{3E8967D4-FF48-447B-9DB9-858742D691FC}" type="datetimeFigureOut">
               <a:rPr lang="en-US" smtClean="0"/>
-              <a:t>9/6/2011</a:t>
+              <a:pPr/>
+              <a:t>12/9/2011</a:t>
             </a:fld>
             <a:endParaRPr lang="en-US"/>
           </a:p>
@@ -1385,6 +1399,7 @@
           <a:p>
             <a:fld id="{C888357B-4C21-44B0-98CD-1548C9C68A62}" type="slidenum">
               <a:rPr lang="en-US" smtClean="0"/>
+              <a:pPr/>
               <a:t>‹#›</a:t>
             </a:fld>
             <a:endParaRPr lang="en-US"/>
@@ -1394,7 +1409,7 @@
     </p:spTree>
     <p:extLst>
       <p:ext uri="{BB962C8B-B14F-4D97-AF65-F5344CB8AC3E}">
-        <p14:creationId xmlns:p14="http://schemas.microsoft.com/office/powerpoint/2010/main" val="3471764114"/>
+        <p14:creationId xmlns:p14="http://schemas.microsoft.com/office/powerpoint/2010/main" xmlns="" val="3471764114"/>
       </p:ext>
     </p:extLst>
   </p:cSld>
@@ -1765,7 +1780,8 @@
           <a:p>
             <a:fld id="{3E8967D4-FF48-447B-9DB9-858742D691FC}" type="datetimeFigureOut">
               <a:rPr lang="en-US" smtClean="0"/>
-              <a:t>9/6/2011</a:t>
+              <a:pPr/>
+              <a:t>12/9/2011</a:t>
             </a:fld>
             <a:endParaRPr lang="en-US"/>
           </a:p>
@@ -1807,6 +1823,7 @@
           <a:p>
             <a:fld id="{C888357B-4C21-44B0-98CD-1548C9C68A62}" type="slidenum">
               <a:rPr lang="en-US" smtClean="0"/>
+              <a:pPr/>
               <a:t>‹#›</a:t>
             </a:fld>
             <a:endParaRPr lang="en-US"/>
@@ -1816,7 +1833,7 @@
     </p:spTree>
     <p:extLst>
       <p:ext uri="{BB962C8B-B14F-4D97-AF65-F5344CB8AC3E}">
-        <p14:creationId xmlns:p14="http://schemas.microsoft.com/office/powerpoint/2010/main" val="3467884311"/>
+        <p14:creationId xmlns:p14="http://schemas.microsoft.com/office/powerpoint/2010/main" xmlns="" val="3467884311"/>
       </p:ext>
     </p:extLst>
   </p:cSld>
@@ -1883,7 +1900,8 @@
           <a:p>
             <a:fld id="{3E8967D4-FF48-447B-9DB9-858742D691FC}" type="datetimeFigureOut">
               <a:rPr lang="en-US" smtClean="0"/>
-              <a:t>9/6/2011</a:t>
+              <a:pPr/>
+              <a:t>12/9/2011</a:t>
             </a:fld>
             <a:endParaRPr lang="en-US"/>
           </a:p>
@@ -1925,6 +1943,7 @@
           <a:p>
             <a:fld id="{C888357B-4C21-44B0-98CD-1548C9C68A62}" type="slidenum">
               <a:rPr lang="en-US" smtClean="0"/>
+              <a:pPr/>
               <a:t>‹#›</a:t>
             </a:fld>
             <a:endParaRPr lang="en-US"/>
@@ -1934,7 +1953,7 @@
     </p:spTree>
     <p:extLst>
       <p:ext uri="{BB962C8B-B14F-4D97-AF65-F5344CB8AC3E}">
-        <p14:creationId xmlns:p14="http://schemas.microsoft.com/office/powerpoint/2010/main" val="1781745951"/>
+        <p14:creationId xmlns:p14="http://schemas.microsoft.com/office/powerpoint/2010/main" xmlns="" val="1781745951"/>
       </p:ext>
     </p:extLst>
   </p:cSld>
@@ -1978,7 +1997,8 @@
           <a:p>
             <a:fld id="{3E8967D4-FF48-447B-9DB9-858742D691FC}" type="datetimeFigureOut">
               <a:rPr lang="en-US" smtClean="0"/>
-              <a:t>9/6/2011</a:t>
+              <a:pPr/>
+              <a:t>12/9/2011</a:t>
             </a:fld>
             <a:endParaRPr lang="en-US"/>
           </a:p>
@@ -2020,6 +2040,7 @@
           <a:p>
             <a:fld id="{C888357B-4C21-44B0-98CD-1548C9C68A62}" type="slidenum">
               <a:rPr lang="en-US" smtClean="0"/>
+              <a:pPr/>
               <a:t>‹#›</a:t>
             </a:fld>
             <a:endParaRPr lang="en-US"/>
@@ -2029,7 +2050,7 @@
     </p:spTree>
     <p:extLst>
       <p:ext uri="{BB962C8B-B14F-4D97-AF65-F5344CB8AC3E}">
-        <p14:creationId xmlns:p14="http://schemas.microsoft.com/office/powerpoint/2010/main" val="674480359"/>
+        <p14:creationId xmlns:p14="http://schemas.microsoft.com/office/powerpoint/2010/main" xmlns="" val="674480359"/>
       </p:ext>
     </p:extLst>
   </p:cSld>
@@ -2255,7 +2276,8 @@
           <a:p>
             <a:fld id="{3E8967D4-FF48-447B-9DB9-858742D691FC}" type="datetimeFigureOut">
               <a:rPr lang="en-US" smtClean="0"/>
-              <a:t>9/6/2011</a:t>
+              <a:pPr/>
+              <a:t>12/9/2011</a:t>
             </a:fld>
             <a:endParaRPr lang="en-US"/>
           </a:p>
@@ -2297,6 +2319,7 @@
           <a:p>
             <a:fld id="{C888357B-4C21-44B0-98CD-1548C9C68A62}" type="slidenum">
               <a:rPr lang="en-US" smtClean="0"/>
+              <a:pPr/>
               <a:t>‹#›</a:t>
             </a:fld>
             <a:endParaRPr lang="en-US"/>
@@ -2306,7 +2329,7 @@
     </p:spTree>
     <p:extLst>
       <p:ext uri="{BB962C8B-B14F-4D97-AF65-F5344CB8AC3E}">
-        <p14:creationId xmlns:p14="http://schemas.microsoft.com/office/powerpoint/2010/main" val="1359046856"/>
+        <p14:creationId xmlns:p14="http://schemas.microsoft.com/office/powerpoint/2010/main" xmlns="" val="1359046856"/>
       </p:ext>
     </p:extLst>
   </p:cSld>
@@ -2508,7 +2531,8 @@
           <a:p>
             <a:fld id="{3E8967D4-FF48-447B-9DB9-858742D691FC}" type="datetimeFigureOut">
               <a:rPr lang="en-US" smtClean="0"/>
-              <a:t>9/6/2011</a:t>
+              <a:pPr/>
+              <a:t>12/9/2011</a:t>
             </a:fld>
             <a:endParaRPr lang="en-US"/>
           </a:p>
@@ -2550,6 +2574,7 @@
           <a:p>
             <a:fld id="{C888357B-4C21-44B0-98CD-1548C9C68A62}" type="slidenum">
               <a:rPr lang="en-US" smtClean="0"/>
+              <a:pPr/>
               <a:t>‹#›</a:t>
             </a:fld>
             <a:endParaRPr lang="en-US"/>
@@ -2559,7 +2584,7 @@
     </p:spTree>
     <p:extLst>
       <p:ext uri="{BB962C8B-B14F-4D97-AF65-F5344CB8AC3E}">
-        <p14:creationId xmlns:p14="http://schemas.microsoft.com/office/powerpoint/2010/main" val="3492202625"/>
+        <p14:creationId xmlns:p14="http://schemas.microsoft.com/office/powerpoint/2010/main" xmlns="" val="3492202625"/>
       </p:ext>
     </p:extLst>
   </p:cSld>
@@ -2721,7 +2746,8 @@
           <a:p>
             <a:fld id="{3E8967D4-FF48-447B-9DB9-858742D691FC}" type="datetimeFigureOut">
               <a:rPr lang="en-US" smtClean="0"/>
-              <a:t>9/6/2011</a:t>
+              <a:pPr/>
+              <a:t>12/9/2011</a:t>
             </a:fld>
             <a:endParaRPr lang="en-US"/>
           </a:p>
@@ -2799,6 +2825,7 @@
           <a:p>
             <a:fld id="{C888357B-4C21-44B0-98CD-1548C9C68A62}" type="slidenum">
               <a:rPr lang="en-US" smtClean="0"/>
+              <a:pPr/>
               <a:t>‹#›</a:t>
             </a:fld>
             <a:endParaRPr lang="en-US"/>
@@ -2808,7 +2835,7 @@
     </p:spTree>
     <p:extLst>
       <p:ext uri="{BB962C8B-B14F-4D97-AF65-F5344CB8AC3E}">
-        <p14:creationId xmlns:p14="http://schemas.microsoft.com/office/powerpoint/2010/main" val="2239059231"/>
+        <p14:creationId xmlns:p14="http://schemas.microsoft.com/office/powerpoint/2010/main" xmlns="" val="2239059231"/>
       </p:ext>
     </p:extLst>
   </p:cSld>
@@ -3983,7 +4010,7 @@
     </p:spTree>
     <p:extLst>
       <p:ext uri="{BB962C8B-B14F-4D97-AF65-F5344CB8AC3E}">
-        <p14:creationId xmlns:p14="http://schemas.microsoft.com/office/powerpoint/2010/main" val="2945018409"/>
+        <p14:creationId xmlns:p14="http://schemas.microsoft.com/office/powerpoint/2010/main" xmlns="" val="2945018409"/>
       </p:ext>
     </p:extLst>
   </p:cSld>
@@ -4010,6 +4037,1035 @@
           <a:chExt cx="0" cy="0"/>
         </a:xfrm>
       </p:grpSpPr>
+      <p:grpSp>
+        <p:nvGrpSpPr>
+          <p:cNvPr id="2" name="Group 10"/>
+          <p:cNvGrpSpPr/>
+          <p:nvPr/>
+        </p:nvGrpSpPr>
+        <p:grpSpPr>
+          <a:xfrm>
+            <a:off x="228600" y="457200"/>
+            <a:ext cx="5036642" cy="5040115"/>
+            <a:chOff x="1135558" y="217055"/>
+            <a:chExt cx="5951042" cy="5955145"/>
+          </a:xfrm>
+        </p:grpSpPr>
+        <p:sp>
+          <p:nvSpPr>
+            <p:cNvPr id="4" name="Rectangle 3"/>
+            <p:cNvSpPr/>
+            <p:nvPr/>
+          </p:nvSpPr>
+          <p:spPr>
+            <a:xfrm>
+              <a:off x="2514600" y="1600200"/>
+              <a:ext cx="4572000" cy="4572000"/>
+            </a:xfrm>
+            <a:prstGeom prst="rect">
+              <a:avLst/>
+            </a:prstGeom>
+            <a:solidFill>
+              <a:schemeClr val="bg1"/>
+            </a:solidFill>
+            <a:ln>
+              <a:solidFill>
+                <a:schemeClr val="tx1"/>
+              </a:solidFill>
+            </a:ln>
+          </p:spPr>
+          <p:style>
+            <a:lnRef idx="2">
+              <a:schemeClr val="accent1">
+                <a:shade val="50000"/>
+              </a:schemeClr>
+            </a:lnRef>
+            <a:fillRef idx="1">
+              <a:schemeClr val="accent1"/>
+            </a:fillRef>
+            <a:effectRef idx="0">
+              <a:schemeClr val="accent1"/>
+            </a:effectRef>
+            <a:fontRef idx="minor">
+              <a:schemeClr val="lt1"/>
+            </a:fontRef>
+          </p:style>
+          <p:txBody>
+            <a:bodyPr rtlCol="0" anchor="ctr"/>
+            <a:lstStyle/>
+            <a:p>
+              <a:pPr algn="ctr"/>
+              <a:endParaRPr lang="en-US" sz="1600"/>
+            </a:p>
+          </p:txBody>
+        </p:sp>
+        <p:cxnSp>
+          <p:nvCxnSpPr>
+            <p:cNvPr id="6" name="Straight Connector 5"/>
+            <p:cNvCxnSpPr>
+              <a:stCxn id="4" idx="0"/>
+              <a:endCxn id="4" idx="2"/>
+            </p:cNvCxnSpPr>
+            <p:nvPr/>
+          </p:nvCxnSpPr>
+          <p:spPr>
+            <a:xfrm>
+              <a:off x="4800600" y="1600200"/>
+              <a:ext cx="0" cy="4572000"/>
+            </a:xfrm>
+            <a:prstGeom prst="line">
+              <a:avLst/>
+            </a:prstGeom>
+            <a:ln w="25400">
+              <a:solidFill>
+                <a:schemeClr val="tx1"/>
+              </a:solidFill>
+            </a:ln>
+          </p:spPr>
+          <p:style>
+            <a:lnRef idx="1">
+              <a:schemeClr val="accent1"/>
+            </a:lnRef>
+            <a:fillRef idx="0">
+              <a:schemeClr val="accent1"/>
+            </a:fillRef>
+            <a:effectRef idx="0">
+              <a:schemeClr val="accent1"/>
+            </a:effectRef>
+            <a:fontRef idx="minor">
+              <a:schemeClr val="tx1"/>
+            </a:fontRef>
+          </p:style>
+        </p:cxnSp>
+        <p:cxnSp>
+          <p:nvCxnSpPr>
+            <p:cNvPr id="8" name="Straight Connector 7"/>
+            <p:cNvCxnSpPr>
+              <a:stCxn id="4" idx="1"/>
+              <a:endCxn id="4" idx="3"/>
+            </p:cNvCxnSpPr>
+            <p:nvPr/>
+          </p:nvCxnSpPr>
+          <p:spPr>
+            <a:xfrm>
+              <a:off x="2514600" y="3886200"/>
+              <a:ext cx="4572000" cy="0"/>
+            </a:xfrm>
+            <a:prstGeom prst="line">
+              <a:avLst/>
+            </a:prstGeom>
+            <a:ln w="25400">
+              <a:solidFill>
+                <a:schemeClr val="tx1"/>
+              </a:solidFill>
+            </a:ln>
+          </p:spPr>
+          <p:style>
+            <a:lnRef idx="1">
+              <a:schemeClr val="accent1"/>
+            </a:lnRef>
+            <a:fillRef idx="0">
+              <a:schemeClr val="accent1"/>
+            </a:fillRef>
+            <a:effectRef idx="0">
+              <a:schemeClr val="accent1"/>
+            </a:effectRef>
+            <a:fontRef idx="minor">
+              <a:schemeClr val="tx1"/>
+            </a:fontRef>
+          </p:style>
+        </p:cxnSp>
+        <p:cxnSp>
+          <p:nvCxnSpPr>
+            <p:cNvPr id="10" name="Straight Connector 9"/>
+            <p:cNvCxnSpPr/>
+            <p:nvPr/>
+          </p:nvCxnSpPr>
+          <p:spPr>
+            <a:xfrm>
+              <a:off x="2514600" y="1600200"/>
+              <a:ext cx="4572000" cy="4572000"/>
+            </a:xfrm>
+            <a:prstGeom prst="line">
+              <a:avLst/>
+            </a:prstGeom>
+            <a:ln w="25400">
+              <a:solidFill>
+                <a:schemeClr val="tx1"/>
+              </a:solidFill>
+            </a:ln>
+          </p:spPr>
+          <p:style>
+            <a:lnRef idx="1">
+              <a:schemeClr val="accent1"/>
+            </a:lnRef>
+            <a:fillRef idx="0">
+              <a:schemeClr val="accent1"/>
+            </a:fillRef>
+            <a:effectRef idx="0">
+              <a:schemeClr val="accent1"/>
+            </a:effectRef>
+            <a:fontRef idx="minor">
+              <a:schemeClr val="tx1"/>
+            </a:fontRef>
+          </p:style>
+        </p:cxnSp>
+        <p:cxnSp>
+          <p:nvCxnSpPr>
+            <p:cNvPr id="12" name="Straight Connector 11"/>
+            <p:cNvCxnSpPr>
+              <a:stCxn id="4" idx="1"/>
+              <a:endCxn id="4" idx="2"/>
+            </p:cNvCxnSpPr>
+            <p:nvPr/>
+          </p:nvCxnSpPr>
+          <p:spPr>
+            <a:xfrm>
+              <a:off x="2514600" y="3886200"/>
+              <a:ext cx="2286000" cy="2286000"/>
+            </a:xfrm>
+            <a:prstGeom prst="line">
+              <a:avLst/>
+            </a:prstGeom>
+            <a:ln w="25400">
+              <a:solidFill>
+                <a:schemeClr val="tx1"/>
+              </a:solidFill>
+            </a:ln>
+          </p:spPr>
+          <p:style>
+            <a:lnRef idx="1">
+              <a:schemeClr val="accent1"/>
+            </a:lnRef>
+            <a:fillRef idx="0">
+              <a:schemeClr val="accent1"/>
+            </a:fillRef>
+            <a:effectRef idx="0">
+              <a:schemeClr val="accent1"/>
+            </a:effectRef>
+            <a:fontRef idx="minor">
+              <a:schemeClr val="tx1"/>
+            </a:fontRef>
+          </p:style>
+        </p:cxnSp>
+        <p:cxnSp>
+          <p:nvCxnSpPr>
+            <p:cNvPr id="14" name="Straight Connector 13"/>
+            <p:cNvCxnSpPr>
+              <a:stCxn id="4" idx="0"/>
+              <a:endCxn id="4" idx="3"/>
+            </p:cNvCxnSpPr>
+            <p:nvPr/>
+          </p:nvCxnSpPr>
+          <p:spPr>
+            <a:xfrm>
+              <a:off x="4800600" y="1600200"/>
+              <a:ext cx="2286000" cy="2286000"/>
+            </a:xfrm>
+            <a:prstGeom prst="line">
+              <a:avLst/>
+            </a:prstGeom>
+            <a:ln w="25400">
+              <a:solidFill>
+                <a:schemeClr val="tx1"/>
+              </a:solidFill>
+            </a:ln>
+          </p:spPr>
+          <p:style>
+            <a:lnRef idx="1">
+              <a:schemeClr val="accent1"/>
+            </a:lnRef>
+            <a:fillRef idx="0">
+              <a:schemeClr val="accent1"/>
+            </a:fillRef>
+            <a:effectRef idx="0">
+              <a:schemeClr val="accent1"/>
+            </a:effectRef>
+            <a:fontRef idx="minor">
+              <a:schemeClr val="tx1"/>
+            </a:fontRef>
+          </p:style>
+        </p:cxnSp>
+        <p:sp>
+          <p:nvSpPr>
+            <p:cNvPr id="15" name="TextBox 14"/>
+            <p:cNvSpPr txBox="1"/>
+            <p:nvPr/>
+          </p:nvSpPr>
+          <p:spPr>
+            <a:xfrm>
+              <a:off x="3387132" y="752904"/>
+              <a:ext cx="486030" cy="769442"/>
+            </a:xfrm>
+            <a:prstGeom prst="rect">
+              <a:avLst/>
+            </a:prstGeom>
+            <a:noFill/>
+          </p:spPr>
+          <p:txBody>
+            <a:bodyPr wrap="none" rtlCol="0">
+              <a:spAutoFit/>
+            </a:bodyPr>
+            <a:lstStyle/>
+            <a:p>
+              <a:pPr algn="ctr"/>
+              <a:r>
+                <a:rPr lang="en-US" sz="4400" dirty="0" smtClean="0">
+                  <a:solidFill>
+                    <a:schemeClr val="accent5">
+                      <a:lumMod val="75000"/>
+                    </a:schemeClr>
+                  </a:solidFill>
+                </a:rPr>
+                <a:t>C</a:t>
+              </a:r>
+              <a:endParaRPr lang="en-US" sz="4400" dirty="0">
+                <a:solidFill>
+                  <a:schemeClr val="accent5">
+                    <a:lumMod val="75000"/>
+                  </a:schemeClr>
+                </a:solidFill>
+              </a:endParaRPr>
+            </a:p>
+          </p:txBody>
+        </p:sp>
+        <p:sp>
+          <p:nvSpPr>
+            <p:cNvPr id="16" name="TextBox 15"/>
+            <p:cNvSpPr txBox="1"/>
+            <p:nvPr/>
+          </p:nvSpPr>
+          <p:spPr>
+            <a:xfrm>
+              <a:off x="5772609" y="752904"/>
+              <a:ext cx="532518" cy="769442"/>
+            </a:xfrm>
+            <a:prstGeom prst="rect">
+              <a:avLst/>
+            </a:prstGeom>
+            <a:noFill/>
+          </p:spPr>
+          <p:txBody>
+            <a:bodyPr wrap="none" rtlCol="0">
+              <a:spAutoFit/>
+            </a:bodyPr>
+            <a:lstStyle/>
+            <a:p>
+              <a:pPr algn="ctr"/>
+              <a:r>
+                <a:rPr lang="en-US" sz="4400" dirty="0" smtClean="0">
+                  <a:solidFill>
+                    <a:schemeClr val="accent5">
+                      <a:lumMod val="75000"/>
+                    </a:schemeClr>
+                  </a:solidFill>
+                </a:rPr>
+                <a:t>D</a:t>
+              </a:r>
+              <a:endParaRPr lang="en-US" sz="4400" dirty="0">
+                <a:solidFill>
+                  <a:schemeClr val="accent5">
+                    <a:lumMod val="75000"/>
+                  </a:schemeClr>
+                </a:solidFill>
+              </a:endParaRPr>
+            </a:p>
+          </p:txBody>
+        </p:sp>
+        <p:sp>
+          <p:nvSpPr>
+            <p:cNvPr id="17" name="TextBox 16"/>
+            <p:cNvSpPr txBox="1"/>
+            <p:nvPr/>
+          </p:nvSpPr>
+          <p:spPr>
+            <a:xfrm>
+              <a:off x="1842426" y="2262841"/>
+              <a:ext cx="486030" cy="769441"/>
+            </a:xfrm>
+            <a:prstGeom prst="rect">
+              <a:avLst/>
+            </a:prstGeom>
+            <a:noFill/>
+          </p:spPr>
+          <p:txBody>
+            <a:bodyPr wrap="none" rtlCol="0">
+              <a:spAutoFit/>
+            </a:bodyPr>
+            <a:lstStyle/>
+            <a:p>
+              <a:pPr algn="ctr"/>
+              <a:r>
+                <a:rPr lang="en-US" sz="4400" dirty="0" smtClean="0">
+                  <a:solidFill>
+                    <a:schemeClr val="accent2">
+                      <a:lumMod val="75000"/>
+                    </a:schemeClr>
+                  </a:solidFill>
+                </a:rPr>
+                <a:t>C</a:t>
+              </a:r>
+              <a:endParaRPr lang="en-US" sz="4400" dirty="0">
+                <a:solidFill>
+                  <a:schemeClr val="accent2">
+                    <a:lumMod val="75000"/>
+                  </a:schemeClr>
+                </a:solidFill>
+              </a:endParaRPr>
+            </a:p>
+          </p:txBody>
+        </p:sp>
+        <p:sp>
+          <p:nvSpPr>
+            <p:cNvPr id="18" name="TextBox 17"/>
+            <p:cNvSpPr txBox="1"/>
+            <p:nvPr/>
+          </p:nvSpPr>
+          <p:spPr>
+            <a:xfrm>
+              <a:off x="1844029" y="4613702"/>
+              <a:ext cx="532518" cy="769441"/>
+            </a:xfrm>
+            <a:prstGeom prst="rect">
+              <a:avLst/>
+            </a:prstGeom>
+            <a:noFill/>
+          </p:spPr>
+          <p:txBody>
+            <a:bodyPr wrap="none" rtlCol="0">
+              <a:spAutoFit/>
+            </a:bodyPr>
+            <a:lstStyle/>
+            <a:p>
+              <a:pPr algn="ctr"/>
+              <a:r>
+                <a:rPr lang="en-US" sz="4400" dirty="0" smtClean="0">
+                  <a:solidFill>
+                    <a:schemeClr val="accent2">
+                      <a:lumMod val="75000"/>
+                    </a:schemeClr>
+                  </a:solidFill>
+                </a:rPr>
+                <a:t>D</a:t>
+              </a:r>
+              <a:endParaRPr lang="en-US" sz="4400" dirty="0">
+                <a:solidFill>
+                  <a:schemeClr val="accent2">
+                    <a:lumMod val="75000"/>
+                  </a:schemeClr>
+                </a:solidFill>
+              </a:endParaRPr>
+            </a:p>
+          </p:txBody>
+        </p:sp>
+        <p:grpSp>
+          <p:nvGrpSpPr>
+            <p:cNvPr id="3" name="Group 1"/>
+            <p:cNvGrpSpPr/>
+            <p:nvPr/>
+          </p:nvGrpSpPr>
+          <p:grpSpPr>
+            <a:xfrm>
+              <a:off x="3046761" y="1826491"/>
+              <a:ext cx="1166772" cy="1642140"/>
+              <a:chOff x="3124907" y="1826491"/>
+              <a:chExt cx="1166772" cy="1642140"/>
+            </a:xfrm>
+          </p:grpSpPr>
+          <p:sp>
+            <p:nvSpPr>
+              <p:cNvPr id="19" name="TextBox 18"/>
+              <p:cNvSpPr txBox="1"/>
+              <p:nvPr/>
+            </p:nvSpPr>
+            <p:spPr>
+              <a:xfrm>
+                <a:off x="3821679" y="1826491"/>
+                <a:ext cx="470000" cy="769441"/>
+              </a:xfrm>
+              <a:prstGeom prst="rect">
+                <a:avLst/>
+              </a:prstGeom>
+              <a:noFill/>
+            </p:spPr>
+            <p:txBody>
+              <a:bodyPr wrap="none" rtlCol="0">
+                <a:spAutoFit/>
+              </a:bodyPr>
+              <a:lstStyle/>
+              <a:p>
+                <a:pPr algn="ctr"/>
+                <a:r>
+                  <a:rPr lang="en-US" sz="4400" dirty="0">
+                    <a:solidFill>
+                      <a:schemeClr val="accent5">
+                        <a:lumMod val="75000"/>
+                      </a:schemeClr>
+                    </a:solidFill>
+                  </a:rPr>
+                  <a:t>7</a:t>
+                </a:r>
+              </a:p>
+            </p:txBody>
+          </p:sp>
+          <p:sp>
+            <p:nvSpPr>
+              <p:cNvPr id="20" name="TextBox 19"/>
+              <p:cNvSpPr txBox="1"/>
+              <p:nvPr/>
+            </p:nvSpPr>
+            <p:spPr>
+              <a:xfrm>
+                <a:off x="3124907" y="2699190"/>
+                <a:ext cx="470000" cy="769441"/>
+              </a:xfrm>
+              <a:prstGeom prst="rect">
+                <a:avLst/>
+              </a:prstGeom>
+              <a:noFill/>
+            </p:spPr>
+            <p:txBody>
+              <a:bodyPr wrap="none" rtlCol="0">
+                <a:spAutoFit/>
+              </a:bodyPr>
+              <a:lstStyle/>
+              <a:p>
+                <a:pPr algn="ctr"/>
+                <a:r>
+                  <a:rPr lang="en-US" sz="4400" dirty="0">
+                    <a:solidFill>
+                      <a:schemeClr val="accent2">
+                        <a:lumMod val="75000"/>
+                      </a:schemeClr>
+                    </a:solidFill>
+                  </a:rPr>
+                  <a:t>7</a:t>
+                </a:r>
+              </a:p>
+            </p:txBody>
+          </p:sp>
+        </p:grpSp>
+        <p:grpSp>
+          <p:nvGrpSpPr>
+            <p:cNvPr id="5" name="Group 2"/>
+            <p:cNvGrpSpPr/>
+            <p:nvPr/>
+          </p:nvGrpSpPr>
+          <p:grpSpPr>
+            <a:xfrm>
+              <a:off x="5260116" y="1826491"/>
+              <a:ext cx="1543878" cy="1642140"/>
+              <a:chOff x="5260116" y="1826491"/>
+              <a:chExt cx="1543878" cy="1642140"/>
+            </a:xfrm>
+          </p:grpSpPr>
+          <p:sp>
+            <p:nvSpPr>
+              <p:cNvPr id="21" name="TextBox 20"/>
+              <p:cNvSpPr txBox="1"/>
+              <p:nvPr/>
+            </p:nvSpPr>
+            <p:spPr>
+              <a:xfrm>
+                <a:off x="6048659" y="1826491"/>
+                <a:ext cx="755335" cy="769441"/>
+              </a:xfrm>
+              <a:prstGeom prst="rect">
+                <a:avLst/>
+              </a:prstGeom>
+              <a:noFill/>
+            </p:spPr>
+            <p:txBody>
+              <a:bodyPr wrap="none" rtlCol="0">
+                <a:spAutoFit/>
+              </a:bodyPr>
+              <a:lstStyle/>
+              <a:p>
+                <a:pPr algn="ctr"/>
+                <a:r>
+                  <a:rPr lang="en-US" sz="4400" dirty="0" smtClean="0">
+                    <a:solidFill>
+                      <a:schemeClr val="accent5">
+                        <a:lumMod val="75000"/>
+                      </a:schemeClr>
+                    </a:solidFill>
+                  </a:rPr>
+                  <a:t>10</a:t>
+                </a:r>
+                <a:endParaRPr lang="en-US" sz="4400" dirty="0">
+                  <a:solidFill>
+                    <a:schemeClr val="accent5">
+                      <a:lumMod val="75000"/>
+                    </a:schemeClr>
+                  </a:solidFill>
+                </a:endParaRPr>
+              </a:p>
+            </p:txBody>
+          </p:sp>
+          <p:sp>
+            <p:nvSpPr>
+              <p:cNvPr id="22" name="TextBox 21"/>
+              <p:cNvSpPr txBox="1"/>
+              <p:nvPr/>
+            </p:nvSpPr>
+            <p:spPr>
+              <a:xfrm>
+                <a:off x="5260116" y="2699190"/>
+                <a:ext cx="470000" cy="769441"/>
+              </a:xfrm>
+              <a:prstGeom prst="rect">
+                <a:avLst/>
+              </a:prstGeom>
+              <a:noFill/>
+            </p:spPr>
+            <p:txBody>
+              <a:bodyPr wrap="none" rtlCol="0">
+                <a:spAutoFit/>
+              </a:bodyPr>
+              <a:lstStyle/>
+              <a:p>
+                <a:pPr algn="ctr"/>
+                <a:r>
+                  <a:rPr lang="en-US" sz="4400" dirty="0" smtClean="0">
+                    <a:solidFill>
+                      <a:schemeClr val="accent2">
+                        <a:lumMod val="75000"/>
+                      </a:schemeClr>
+                    </a:solidFill>
+                  </a:rPr>
+                  <a:t>0</a:t>
+                </a:r>
+                <a:endParaRPr lang="en-US" sz="4400" dirty="0">
+                  <a:solidFill>
+                    <a:schemeClr val="accent2">
+                      <a:lumMod val="75000"/>
+                    </a:schemeClr>
+                  </a:solidFill>
+                </a:endParaRPr>
+              </a:p>
+            </p:txBody>
+          </p:sp>
+        </p:grpSp>
+        <p:grpSp>
+          <p:nvGrpSpPr>
+            <p:cNvPr id="7" name="Group 4"/>
+            <p:cNvGrpSpPr/>
+            <p:nvPr/>
+          </p:nvGrpSpPr>
+          <p:grpSpPr>
+            <a:xfrm>
+              <a:off x="2982240" y="4156502"/>
+              <a:ext cx="1309439" cy="1683841"/>
+              <a:chOff x="2982240" y="4156502"/>
+              <a:chExt cx="1309439" cy="1683841"/>
+            </a:xfrm>
+          </p:grpSpPr>
+          <p:sp>
+            <p:nvSpPr>
+              <p:cNvPr id="23" name="TextBox 22"/>
+              <p:cNvSpPr txBox="1"/>
+              <p:nvPr/>
+            </p:nvSpPr>
+            <p:spPr>
+              <a:xfrm>
+                <a:off x="3821679" y="4156502"/>
+                <a:ext cx="470000" cy="769441"/>
+              </a:xfrm>
+              <a:prstGeom prst="rect">
+                <a:avLst/>
+              </a:prstGeom>
+              <a:noFill/>
+            </p:spPr>
+            <p:txBody>
+              <a:bodyPr wrap="none" rtlCol="0">
+                <a:spAutoFit/>
+              </a:bodyPr>
+              <a:lstStyle/>
+              <a:p>
+                <a:pPr algn="ctr"/>
+                <a:r>
+                  <a:rPr lang="en-US" sz="4400" dirty="0" smtClean="0">
+                    <a:solidFill>
+                      <a:schemeClr val="accent5">
+                        <a:lumMod val="75000"/>
+                      </a:schemeClr>
+                    </a:solidFill>
+                  </a:rPr>
+                  <a:t>0</a:t>
+                </a:r>
+                <a:endParaRPr lang="en-US" sz="4400" dirty="0">
+                  <a:solidFill>
+                    <a:schemeClr val="accent5">
+                      <a:lumMod val="75000"/>
+                    </a:schemeClr>
+                  </a:solidFill>
+                </a:endParaRPr>
+              </a:p>
+            </p:txBody>
+          </p:sp>
+          <p:sp>
+            <p:nvSpPr>
+              <p:cNvPr id="24" name="TextBox 23"/>
+              <p:cNvSpPr txBox="1"/>
+              <p:nvPr/>
+            </p:nvSpPr>
+            <p:spPr>
+              <a:xfrm>
+                <a:off x="2982240" y="5070902"/>
+                <a:ext cx="755335" cy="769441"/>
+              </a:xfrm>
+              <a:prstGeom prst="rect">
+                <a:avLst/>
+              </a:prstGeom>
+              <a:noFill/>
+            </p:spPr>
+            <p:txBody>
+              <a:bodyPr wrap="none" rtlCol="0">
+                <a:spAutoFit/>
+              </a:bodyPr>
+              <a:lstStyle/>
+              <a:p>
+                <a:pPr algn="ctr"/>
+                <a:r>
+                  <a:rPr lang="en-US" sz="4400" dirty="0" smtClean="0">
+                    <a:solidFill>
+                      <a:schemeClr val="accent2">
+                        <a:lumMod val="75000"/>
+                      </a:schemeClr>
+                    </a:solidFill>
+                  </a:rPr>
+                  <a:t>10</a:t>
+                </a:r>
+                <a:endParaRPr lang="en-US" sz="4400" dirty="0">
+                  <a:solidFill>
+                    <a:schemeClr val="accent2">
+                      <a:lumMod val="75000"/>
+                    </a:schemeClr>
+                  </a:solidFill>
+                </a:endParaRPr>
+              </a:p>
+            </p:txBody>
+          </p:sp>
+        </p:grpSp>
+        <p:grpSp>
+          <p:nvGrpSpPr>
+            <p:cNvPr id="9" name="Group 6"/>
+            <p:cNvGrpSpPr/>
+            <p:nvPr/>
+          </p:nvGrpSpPr>
+          <p:grpSpPr>
+            <a:xfrm>
+              <a:off x="5338262" y="4156502"/>
+              <a:ext cx="1401210" cy="1683841"/>
+              <a:chOff x="5260116" y="4156502"/>
+              <a:chExt cx="1401210" cy="1683841"/>
+            </a:xfrm>
+          </p:grpSpPr>
+          <p:sp>
+            <p:nvSpPr>
+              <p:cNvPr id="25" name="TextBox 24"/>
+              <p:cNvSpPr txBox="1"/>
+              <p:nvPr/>
+            </p:nvSpPr>
+            <p:spPr>
+              <a:xfrm>
+                <a:off x="6191326" y="4156502"/>
+                <a:ext cx="470000" cy="769441"/>
+              </a:xfrm>
+              <a:prstGeom prst="rect">
+                <a:avLst/>
+              </a:prstGeom>
+              <a:noFill/>
+            </p:spPr>
+            <p:txBody>
+              <a:bodyPr wrap="none" rtlCol="0">
+                <a:spAutoFit/>
+              </a:bodyPr>
+              <a:lstStyle/>
+              <a:p>
+                <a:pPr algn="ctr"/>
+                <a:r>
+                  <a:rPr lang="en-US" sz="4400" dirty="0">
+                    <a:solidFill>
+                      <a:schemeClr val="accent5">
+                        <a:lumMod val="75000"/>
+                      </a:schemeClr>
+                    </a:solidFill>
+                  </a:rPr>
+                  <a:t>3</a:t>
+                </a:r>
+              </a:p>
+            </p:txBody>
+          </p:sp>
+          <p:sp>
+            <p:nvSpPr>
+              <p:cNvPr id="26" name="TextBox 25"/>
+              <p:cNvSpPr txBox="1"/>
+              <p:nvPr/>
+            </p:nvSpPr>
+            <p:spPr>
+              <a:xfrm>
+                <a:off x="5260116" y="5070902"/>
+                <a:ext cx="470000" cy="769441"/>
+              </a:xfrm>
+              <a:prstGeom prst="rect">
+                <a:avLst/>
+              </a:prstGeom>
+              <a:noFill/>
+            </p:spPr>
+            <p:txBody>
+              <a:bodyPr wrap="none" rtlCol="0">
+                <a:spAutoFit/>
+              </a:bodyPr>
+              <a:lstStyle/>
+              <a:p>
+                <a:pPr algn="ctr"/>
+                <a:r>
+                  <a:rPr lang="en-US" sz="4400" dirty="0">
+                    <a:solidFill>
+                      <a:schemeClr val="accent2">
+                        <a:lumMod val="75000"/>
+                      </a:schemeClr>
+                    </a:solidFill>
+                  </a:rPr>
+                  <a:t>3</a:t>
+                </a:r>
+              </a:p>
+            </p:txBody>
+          </p:sp>
+        </p:grpSp>
+        <p:sp>
+          <p:nvSpPr>
+            <p:cNvPr id="27" name="TextBox 26"/>
+            <p:cNvSpPr txBox="1"/>
+            <p:nvPr/>
+          </p:nvSpPr>
+          <p:spPr>
+            <a:xfrm>
+              <a:off x="3955463" y="217055"/>
+              <a:ext cx="1837619" cy="707886"/>
+            </a:xfrm>
+            <a:prstGeom prst="rect">
+              <a:avLst/>
+            </a:prstGeom>
+            <a:noFill/>
+          </p:spPr>
+          <p:txBody>
+            <a:bodyPr wrap="none" rtlCol="0">
+              <a:spAutoFit/>
+            </a:bodyPr>
+            <a:lstStyle/>
+            <a:p>
+              <a:pPr algn="ctr"/>
+              <a:r>
+                <a:rPr lang="en-US" sz="4000" dirty="0" smtClean="0">
+                  <a:solidFill>
+                    <a:schemeClr val="accent5">
+                      <a:lumMod val="75000"/>
+                    </a:schemeClr>
+                  </a:solidFill>
+                </a:rPr>
+                <a:t>Player 1</a:t>
+              </a:r>
+              <a:endParaRPr lang="en-US" sz="4000" dirty="0">
+                <a:solidFill>
+                  <a:schemeClr val="accent5">
+                    <a:lumMod val="75000"/>
+                  </a:schemeClr>
+                </a:solidFill>
+              </a:endParaRPr>
+            </a:p>
+          </p:txBody>
+        </p:sp>
+        <p:sp>
+          <p:nvSpPr>
+            <p:cNvPr id="28" name="TextBox 27"/>
+            <p:cNvSpPr txBox="1"/>
+            <p:nvPr/>
+          </p:nvSpPr>
+          <p:spPr>
+            <a:xfrm rot="16200000">
+              <a:off x="570691" y="3474810"/>
+              <a:ext cx="1837619" cy="707886"/>
+            </a:xfrm>
+            <a:prstGeom prst="rect">
+              <a:avLst/>
+            </a:prstGeom>
+            <a:noFill/>
+          </p:spPr>
+          <p:txBody>
+            <a:bodyPr wrap="none" rtlCol="0">
+              <a:spAutoFit/>
+            </a:bodyPr>
+            <a:lstStyle/>
+            <a:p>
+              <a:pPr algn="ctr"/>
+              <a:r>
+                <a:rPr lang="en-US" sz="4000" dirty="0" smtClean="0">
+                  <a:solidFill>
+                    <a:schemeClr val="accent2">
+                      <a:lumMod val="75000"/>
+                    </a:schemeClr>
+                  </a:solidFill>
+                </a:rPr>
+                <a:t>Player 2</a:t>
+              </a:r>
+              <a:endParaRPr lang="en-US" sz="4000" dirty="0">
+                <a:solidFill>
+                  <a:schemeClr val="accent2">
+                    <a:lumMod val="75000"/>
+                  </a:schemeClr>
+                </a:solidFill>
+              </a:endParaRPr>
+            </a:p>
+          </p:txBody>
+        </p:sp>
+      </p:grpSp>
+      <p:sp>
+        <p:nvSpPr>
+          <p:cNvPr id="29" name="TextBox 28"/>
+          <p:cNvSpPr txBox="1"/>
+          <p:nvPr/>
+        </p:nvSpPr>
+        <p:spPr>
+          <a:xfrm>
+            <a:off x="5334000" y="1600200"/>
+            <a:ext cx="3534301" cy="3970318"/>
+          </a:xfrm>
+          <a:prstGeom prst="rect">
+            <a:avLst/>
+          </a:prstGeom>
+          <a:noFill/>
+        </p:spPr>
+        <p:txBody>
+          <a:bodyPr wrap="none" rtlCol="0">
+            <a:spAutoFit/>
+          </a:bodyPr>
+          <a:lstStyle/>
+          <a:p>
+            <a:r>
+              <a:rPr lang="en-US" dirty="0" smtClean="0"/>
+              <a:t>“C” = cooperate or open science</a:t>
+            </a:r>
+          </a:p>
+          <a:p>
+            <a:r>
+              <a:rPr lang="en-US" dirty="0" smtClean="0"/>
+              <a:t>“D” = defect or closed science</a:t>
+            </a:r>
+          </a:p>
+          <a:p>
+            <a:endParaRPr lang="en-US" dirty="0" smtClean="0"/>
+          </a:p>
+          <a:p>
+            <a:r>
+              <a:rPr lang="en-US" dirty="0" smtClean="0"/>
+              <a:t>E.g., If both players cooperate, each</a:t>
+            </a:r>
+            <a:br>
+              <a:rPr lang="en-US" dirty="0" smtClean="0"/>
+            </a:br>
+            <a:r>
+              <a:rPr lang="en-US" dirty="0" smtClean="0"/>
+              <a:t>gets 7 points reward.</a:t>
+            </a:r>
+          </a:p>
+          <a:p>
+            <a:endParaRPr lang="en-US" dirty="0" smtClean="0"/>
+          </a:p>
+          <a:p>
+            <a:r>
+              <a:rPr lang="en-US" dirty="0" smtClean="0"/>
+              <a:t>If both players defect, each gets </a:t>
+            </a:r>
+            <a:br>
+              <a:rPr lang="en-US" dirty="0" smtClean="0"/>
+            </a:br>
+            <a:r>
+              <a:rPr lang="en-US" dirty="0" smtClean="0"/>
+              <a:t>3 points reward.</a:t>
+            </a:r>
+          </a:p>
+          <a:p>
+            <a:endParaRPr lang="en-US" dirty="0" smtClean="0"/>
+          </a:p>
+          <a:p>
+            <a:r>
+              <a:rPr lang="en-US" dirty="0" smtClean="0"/>
+              <a:t>If one defects, other doesn’t, </a:t>
+            </a:r>
+            <a:br>
+              <a:rPr lang="en-US" dirty="0" smtClean="0"/>
+            </a:br>
+            <a:r>
+              <a:rPr lang="en-US" dirty="0" smtClean="0"/>
+              <a:t>defector gets 10, cooperator gets 0</a:t>
+            </a:r>
+          </a:p>
+          <a:p>
+            <a:endParaRPr lang="en-US" dirty="0" smtClean="0"/>
+          </a:p>
+          <a:p>
+            <a:r>
+              <a:rPr lang="en-US" dirty="0" smtClean="0"/>
+              <a:t>See </a:t>
+            </a:r>
+            <a:r>
+              <a:rPr lang="en-US" dirty="0" err="1" smtClean="0"/>
+              <a:t>github</a:t>
+            </a:r>
+            <a:r>
+              <a:rPr lang="en-US" dirty="0" smtClean="0"/>
+              <a:t>/</a:t>
+            </a:r>
+            <a:r>
+              <a:rPr lang="en-US" dirty="0" err="1" smtClean="0"/>
+              <a:t>olendorf</a:t>
+            </a:r>
+            <a:r>
+              <a:rPr lang="en-US" dirty="0" smtClean="0"/>
+              <a:t>/</a:t>
+            </a:r>
+          </a:p>
+          <a:p>
+            <a:r>
+              <a:rPr lang="en-US" dirty="0" err="1" smtClean="0"/>
+              <a:t>gametheoryopenscience</a:t>
+            </a:r>
+            <a:endParaRPr lang="en-US" dirty="0"/>
+          </a:p>
+        </p:txBody>
+      </p:sp>
+    </p:spTree>
+    <p:extLst>
+      <p:ext uri="{BB962C8B-B14F-4D97-AF65-F5344CB8AC3E}">
+        <p14:creationId xmlns:p14="http://schemas.microsoft.com/office/powerpoint/2010/main" xmlns="" val="2945018409"/>
+      </p:ext>
+    </p:extLst>
+  </p:cSld>
+  <p:clrMapOvr>
+    <a:masterClrMapping/>
+  </p:clrMapOvr>
+</p:sld>
+</file>
+
+<file path=ppt/slides/slide3.xml><?xml version="1.0" encoding="utf-8"?>
+<p:sld xmlns:a="http://schemas.openxmlformats.org/drawingml/2006/main" xmlns:r="http://schemas.openxmlformats.org/officeDocument/2006/relationships" xmlns:p="http://schemas.openxmlformats.org/presentationml/2006/main">
+  <p:cSld>
+    <p:spTree>
+      <p:nvGrpSpPr>
+        <p:cNvPr id="1" name=""/>
+        <p:cNvGrpSpPr/>
+        <p:nvPr/>
+      </p:nvGrpSpPr>
+      <p:grpSpPr>
+        <a:xfrm>
+          <a:off x="0" y="0"/>
+          <a:ext cx="0" cy="0"/>
+          <a:chOff x="0" y="0"/>
+          <a:chExt cx="0" cy="0"/>
+        </a:xfrm>
+      </p:grpSpPr>
       <p:sp>
         <p:nvSpPr>
           <p:cNvPr id="4" name="TextBox 3"/>
@@ -4051,9 +5107,602 @@
     </p:spTree>
     <p:extLst>
       <p:ext uri="{BB962C8B-B14F-4D97-AF65-F5344CB8AC3E}">
-        <p14:creationId xmlns:p14="http://schemas.microsoft.com/office/powerpoint/2010/main" val="2925061750"/>
+        <p14:creationId xmlns:p14="http://schemas.microsoft.com/office/powerpoint/2010/main" xmlns="" val="2925061750"/>
       </p:ext>
     </p:extLst>
+  </p:cSld>
+  <p:clrMapOvr>
+    <a:masterClrMapping/>
+  </p:clrMapOvr>
+</p:sld>
+</file>
+
+<file path=ppt/slides/slide4.xml><?xml version="1.0" encoding="utf-8"?>
+<p:sld xmlns:a="http://schemas.openxmlformats.org/drawingml/2006/main" xmlns:r="http://schemas.openxmlformats.org/officeDocument/2006/relationships" xmlns:p="http://schemas.openxmlformats.org/presentationml/2006/main">
+  <p:cSld>
+    <p:spTree>
+      <p:nvGrpSpPr>
+        <p:cNvPr id="1" name=""/>
+        <p:cNvGrpSpPr/>
+        <p:nvPr/>
+      </p:nvGrpSpPr>
+      <p:grpSpPr>
+        <a:xfrm>
+          <a:off x="0" y="0"/>
+          <a:ext cx="0" cy="0"/>
+          <a:chOff x="0" y="0"/>
+          <a:chExt cx="0" cy="0"/>
+        </a:xfrm>
+      </p:grpSpPr>
+      <p:pic>
+        <p:nvPicPr>
+          <p:cNvPr id="1026" name="Picture 2" descr="https://github.com/olendorf/gametheoryopenscience/blob/master/temptationtodefect.png?raw=true"/>
+          <p:cNvPicPr>
+            <a:picLocks noChangeAspect="1" noChangeArrowheads="1"/>
+          </p:cNvPicPr>
+          <p:nvPr/>
+        </p:nvPicPr>
+        <p:blipFill>
+          <a:blip r:embed="rId2" cstate="print"/>
+          <a:srcRect/>
+          <a:stretch>
+            <a:fillRect/>
+          </a:stretch>
+        </p:blipFill>
+        <p:spPr bwMode="auto">
+          <a:xfrm>
+            <a:off x="-76200" y="0"/>
+            <a:ext cx="7315200" cy="6911788"/>
+          </a:xfrm>
+          <a:prstGeom prst="rect">
+            <a:avLst/>
+          </a:prstGeom>
+          <a:noFill/>
+        </p:spPr>
+      </p:pic>
+      <p:cxnSp>
+        <p:nvCxnSpPr>
+          <p:cNvPr id="4" name="Straight Connector 3"/>
+          <p:cNvCxnSpPr>
+            <a:endCxn id="5" idx="1"/>
+          </p:cNvCxnSpPr>
+          <p:nvPr/>
+        </p:nvCxnSpPr>
+        <p:spPr>
+          <a:xfrm>
+            <a:off x="4648200" y="3886200"/>
+            <a:ext cx="0" cy="457200"/>
+          </a:xfrm>
+          <a:prstGeom prst="line">
+            <a:avLst/>
+          </a:prstGeom>
+        </p:spPr>
+        <p:style>
+          <a:lnRef idx="2">
+            <a:schemeClr val="dk1"/>
+          </a:lnRef>
+          <a:fillRef idx="0">
+            <a:schemeClr val="dk1"/>
+          </a:fillRef>
+          <a:effectRef idx="1">
+            <a:schemeClr val="dk1"/>
+          </a:effectRef>
+          <a:fontRef idx="minor">
+            <a:schemeClr val="tx1"/>
+          </a:fontRef>
+        </p:style>
+      </p:cxnSp>
+      <p:sp>
+        <p:nvSpPr>
+          <p:cNvPr id="5" name="Right Arrow 4"/>
+          <p:cNvSpPr/>
+          <p:nvPr/>
+        </p:nvSpPr>
+        <p:spPr>
+          <a:xfrm rot="10800000">
+            <a:off x="4191000" y="4191000"/>
+            <a:ext cx="457200" cy="304800"/>
+          </a:xfrm>
+          <a:prstGeom prst="rightArrow">
+            <a:avLst/>
+          </a:prstGeom>
+        </p:spPr>
+        <p:style>
+          <a:lnRef idx="2">
+            <a:schemeClr val="dk1">
+              <a:shade val="50000"/>
+            </a:schemeClr>
+          </a:lnRef>
+          <a:fillRef idx="1">
+            <a:schemeClr val="dk1"/>
+          </a:fillRef>
+          <a:effectRef idx="0">
+            <a:schemeClr val="dk1"/>
+          </a:effectRef>
+          <a:fontRef idx="minor">
+            <a:schemeClr val="lt1"/>
+          </a:fontRef>
+        </p:style>
+        <p:txBody>
+          <a:bodyPr rtlCol="0" anchor="ctr"/>
+          <a:lstStyle/>
+          <a:p>
+            <a:pPr algn="ctr"/>
+            <a:endParaRPr lang="en-US"/>
+          </a:p>
+        </p:txBody>
+      </p:sp>
+      <p:sp>
+        <p:nvSpPr>
+          <p:cNvPr id="6" name="TextBox 5"/>
+          <p:cNvSpPr txBox="1"/>
+          <p:nvPr/>
+        </p:nvSpPr>
+        <p:spPr>
+          <a:xfrm>
+            <a:off x="1295400" y="3810000"/>
+            <a:ext cx="3255378" cy="1200329"/>
+          </a:xfrm>
+          <a:prstGeom prst="rect">
+            <a:avLst/>
+          </a:prstGeom>
+          <a:noFill/>
+        </p:spPr>
+        <p:txBody>
+          <a:bodyPr wrap="none" rtlCol="0">
+            <a:spAutoFit/>
+          </a:bodyPr>
+          <a:lstStyle/>
+          <a:p>
+            <a:r>
+              <a:rPr lang="en-US" dirty="0" smtClean="0"/>
+              <a:t>If frequency of open science</a:t>
+            </a:r>
+            <a:br>
+              <a:rPr lang="en-US" dirty="0" smtClean="0"/>
+            </a:br>
+            <a:r>
+              <a:rPr lang="en-US" dirty="0" smtClean="0"/>
+              <a:t>cooperators high enough</a:t>
+            </a:r>
+          </a:p>
+          <a:p>
+            <a:r>
+              <a:rPr lang="en-US" dirty="0" smtClean="0"/>
+              <a:t>(low freq. defect.)</a:t>
+            </a:r>
+          </a:p>
+          <a:p>
+            <a:r>
+              <a:rPr lang="en-US" dirty="0" smtClean="0"/>
+              <a:t>then Open Science (TFT) pays off</a:t>
+            </a:r>
+          </a:p>
+        </p:txBody>
+      </p:sp>
+      <p:cxnSp>
+        <p:nvCxnSpPr>
+          <p:cNvPr id="7" name="Straight Connector 6"/>
+          <p:cNvCxnSpPr/>
+          <p:nvPr/>
+        </p:nvCxnSpPr>
+        <p:spPr>
+          <a:xfrm>
+            <a:off x="4648200" y="3276600"/>
+            <a:ext cx="0" cy="609600"/>
+          </a:xfrm>
+          <a:prstGeom prst="line">
+            <a:avLst/>
+          </a:prstGeom>
+        </p:spPr>
+        <p:style>
+          <a:lnRef idx="2">
+            <a:schemeClr val="dk1"/>
+          </a:lnRef>
+          <a:fillRef idx="0">
+            <a:schemeClr val="dk1"/>
+          </a:fillRef>
+          <a:effectRef idx="1">
+            <a:schemeClr val="dk1"/>
+          </a:effectRef>
+          <a:fontRef idx="minor">
+            <a:schemeClr val="tx1"/>
+          </a:fontRef>
+        </p:style>
+      </p:cxnSp>
+      <p:sp>
+        <p:nvSpPr>
+          <p:cNvPr id="8" name="Right Arrow 7"/>
+          <p:cNvSpPr/>
+          <p:nvPr/>
+        </p:nvSpPr>
+        <p:spPr>
+          <a:xfrm>
+            <a:off x="4648200" y="3200400"/>
+            <a:ext cx="457200" cy="304800"/>
+          </a:xfrm>
+          <a:prstGeom prst="rightArrow">
+            <a:avLst/>
+          </a:prstGeom>
+        </p:spPr>
+        <p:style>
+          <a:lnRef idx="2">
+            <a:schemeClr val="dk1">
+              <a:shade val="50000"/>
+            </a:schemeClr>
+          </a:lnRef>
+          <a:fillRef idx="1">
+            <a:schemeClr val="dk1"/>
+          </a:fillRef>
+          <a:effectRef idx="0">
+            <a:schemeClr val="dk1"/>
+          </a:effectRef>
+          <a:fontRef idx="minor">
+            <a:schemeClr val="lt1"/>
+          </a:fontRef>
+        </p:style>
+        <p:txBody>
+          <a:bodyPr rtlCol="0" anchor="ctr"/>
+          <a:lstStyle/>
+          <a:p>
+            <a:pPr algn="ctr"/>
+            <a:endParaRPr lang="en-US"/>
+          </a:p>
+        </p:txBody>
+      </p:sp>
+      <p:sp>
+        <p:nvSpPr>
+          <p:cNvPr id="11" name="TextBox 10"/>
+          <p:cNvSpPr txBox="1"/>
+          <p:nvPr/>
+        </p:nvSpPr>
+        <p:spPr>
+          <a:xfrm>
+            <a:off x="3581400" y="1981200"/>
+            <a:ext cx="2834622" cy="1200329"/>
+          </a:xfrm>
+          <a:prstGeom prst="rect">
+            <a:avLst/>
+          </a:prstGeom>
+          <a:noFill/>
+        </p:spPr>
+        <p:txBody>
+          <a:bodyPr wrap="none" rtlCol="0">
+            <a:spAutoFit/>
+          </a:bodyPr>
+          <a:lstStyle/>
+          <a:p>
+            <a:r>
+              <a:rPr lang="en-US" dirty="0" smtClean="0"/>
+              <a:t>If frequency of open science</a:t>
+            </a:r>
+            <a:br>
+              <a:rPr lang="en-US" dirty="0" smtClean="0"/>
+            </a:br>
+            <a:r>
+              <a:rPr lang="en-US" dirty="0" smtClean="0"/>
+              <a:t>cooperators low</a:t>
+            </a:r>
+          </a:p>
+          <a:p>
+            <a:r>
+              <a:rPr lang="en-US" dirty="0" smtClean="0"/>
+              <a:t>(high freq. defect.)</a:t>
+            </a:r>
+          </a:p>
+          <a:p>
+            <a:r>
+              <a:rPr lang="en-US" dirty="0" smtClean="0"/>
+              <a:t>then closed science (D) wins</a:t>
+            </a:r>
+            <a:endParaRPr lang="en-US" dirty="0"/>
+          </a:p>
+        </p:txBody>
+      </p:sp>
+      <p:sp>
+        <p:nvSpPr>
+          <p:cNvPr id="13" name="TextBox 12"/>
+          <p:cNvSpPr txBox="1"/>
+          <p:nvPr/>
+        </p:nvSpPr>
+        <p:spPr>
+          <a:xfrm>
+            <a:off x="6654857" y="533400"/>
+            <a:ext cx="2489143" cy="5909310"/>
+          </a:xfrm>
+          <a:prstGeom prst="rect">
+            <a:avLst/>
+          </a:prstGeom>
+          <a:noFill/>
+        </p:spPr>
+        <p:txBody>
+          <a:bodyPr wrap="none" rtlCol="0">
+            <a:spAutoFit/>
+          </a:bodyPr>
+          <a:lstStyle/>
+          <a:p>
+            <a:r>
+              <a:rPr lang="en-US" dirty="0" smtClean="0"/>
+              <a:t>Strategies:</a:t>
+            </a:r>
+          </a:p>
+          <a:p>
+            <a:r>
+              <a:rPr lang="en-US" dirty="0" smtClean="0">
+                <a:solidFill>
+                  <a:srgbClr val="C00000"/>
+                </a:solidFill>
+              </a:rPr>
+              <a:t>(1) D = defection,</a:t>
+            </a:r>
+          </a:p>
+          <a:p>
+            <a:r>
+              <a:rPr lang="en-US" dirty="0" smtClean="0">
+                <a:solidFill>
+                  <a:srgbClr val="C00000"/>
+                </a:solidFill>
+              </a:rPr>
+              <a:t>     closed science</a:t>
+            </a:r>
+          </a:p>
+          <a:p>
+            <a:endParaRPr lang="en-US" dirty="0" smtClean="0"/>
+          </a:p>
+          <a:p>
+            <a:r>
+              <a:rPr lang="en-US" dirty="0" smtClean="0">
+                <a:solidFill>
+                  <a:schemeClr val="tx2">
+                    <a:lumMod val="60000"/>
+                    <a:lumOff val="40000"/>
+                  </a:schemeClr>
+                </a:solidFill>
+              </a:rPr>
+              <a:t>(2) TFT = tit for tat,</a:t>
+            </a:r>
+            <a:br>
+              <a:rPr lang="en-US" dirty="0" smtClean="0">
+                <a:solidFill>
+                  <a:schemeClr val="tx2">
+                    <a:lumMod val="60000"/>
+                    <a:lumOff val="40000"/>
+                  </a:schemeClr>
+                </a:solidFill>
+              </a:rPr>
+            </a:br>
+            <a:r>
+              <a:rPr lang="en-US" dirty="0" smtClean="0">
+                <a:solidFill>
+                  <a:schemeClr val="tx2">
+                    <a:lumMod val="60000"/>
+                    <a:lumOff val="40000"/>
+                  </a:schemeClr>
+                </a:solidFill>
+              </a:rPr>
+              <a:t>     open science until</a:t>
+            </a:r>
+            <a:br>
+              <a:rPr lang="en-US" dirty="0" smtClean="0">
+                <a:solidFill>
+                  <a:schemeClr val="tx2">
+                    <a:lumMod val="60000"/>
+                    <a:lumOff val="40000"/>
+                  </a:schemeClr>
+                </a:solidFill>
+              </a:rPr>
+            </a:br>
+            <a:r>
+              <a:rPr lang="en-US" dirty="0" smtClean="0">
+                <a:solidFill>
+                  <a:schemeClr val="tx2">
+                    <a:lumMod val="60000"/>
+                    <a:lumOff val="40000"/>
+                  </a:schemeClr>
+                </a:solidFill>
+              </a:rPr>
+              <a:t>     burned by defector</a:t>
+            </a:r>
+          </a:p>
+          <a:p>
+            <a:endParaRPr lang="en-US" dirty="0" smtClean="0">
+              <a:solidFill>
+                <a:schemeClr val="tx2">
+                  <a:lumMod val="60000"/>
+                  <a:lumOff val="40000"/>
+                </a:schemeClr>
+              </a:solidFill>
+            </a:endParaRPr>
+          </a:p>
+          <a:p>
+            <a:r>
+              <a:rPr lang="en-US" dirty="0" smtClean="0"/>
+              <a:t>(SJK: I can’t remember</a:t>
+            </a:r>
+            <a:br>
+              <a:rPr lang="en-US" dirty="0" smtClean="0"/>
+            </a:br>
+            <a:r>
+              <a:rPr lang="en-US" dirty="0" smtClean="0"/>
+              <a:t>what temptation refers</a:t>
+            </a:r>
+          </a:p>
+          <a:p>
+            <a:r>
+              <a:rPr lang="en-US" dirty="0" smtClean="0"/>
+              <a:t>to)</a:t>
+            </a:r>
+          </a:p>
+          <a:p>
+            <a:endParaRPr lang="en-US" dirty="0" smtClean="0"/>
+          </a:p>
+          <a:p>
+            <a:r>
+              <a:rPr lang="en-US" dirty="0" smtClean="0"/>
+              <a:t>One take home message</a:t>
+            </a:r>
+            <a:br>
+              <a:rPr lang="en-US" dirty="0" smtClean="0"/>
+            </a:br>
+            <a:r>
+              <a:rPr lang="en-US" dirty="0" smtClean="0"/>
+              <a:t>Even with TFT, open </a:t>
+            </a:r>
+          </a:p>
+          <a:p>
+            <a:r>
+              <a:rPr lang="en-US" dirty="0" smtClean="0"/>
+              <a:t>science reaches tipping</a:t>
+            </a:r>
+            <a:br>
+              <a:rPr lang="en-US" dirty="0" smtClean="0"/>
+            </a:br>
+            <a:r>
+              <a:rPr lang="en-US" dirty="0" smtClean="0"/>
+              <a:t>point with enough </a:t>
+            </a:r>
+            <a:br>
+              <a:rPr lang="en-US" dirty="0" smtClean="0"/>
+            </a:br>
+            <a:r>
+              <a:rPr lang="en-US" dirty="0" smtClean="0"/>
+              <a:t>participation</a:t>
+            </a:r>
+          </a:p>
+          <a:p>
+            <a:endParaRPr lang="en-US" dirty="0" smtClean="0"/>
+          </a:p>
+          <a:p>
+            <a:r>
+              <a:rPr lang="en-US" dirty="0" smtClean="0"/>
+              <a:t>Figures by Rob Olendorf</a:t>
+            </a:r>
+            <a:br>
+              <a:rPr lang="en-US" dirty="0" smtClean="0"/>
+            </a:br>
+            <a:r>
+              <a:rPr lang="en-US" dirty="0" smtClean="0"/>
+              <a:t>see </a:t>
+            </a:r>
+            <a:r>
+              <a:rPr lang="en-US" dirty="0" err="1" smtClean="0"/>
+              <a:t>github</a:t>
+            </a:r>
+            <a:r>
+              <a:rPr lang="en-US" dirty="0" smtClean="0"/>
+              <a:t>/</a:t>
+            </a:r>
+            <a:r>
+              <a:rPr lang="en-US" dirty="0" err="1" smtClean="0"/>
+              <a:t>olendorf</a:t>
+            </a:r>
+            <a:r>
+              <a:rPr lang="en-US" dirty="0" smtClean="0"/>
+              <a:t>/</a:t>
+            </a:r>
+          </a:p>
+          <a:p>
+            <a:r>
+              <a:rPr lang="en-US" dirty="0" err="1" smtClean="0"/>
+              <a:t>gametheoryopenscience</a:t>
+            </a:r>
+            <a:endParaRPr lang="en-US" dirty="0"/>
+          </a:p>
+        </p:txBody>
+      </p:sp>
+      <p:sp>
+        <p:nvSpPr>
+          <p:cNvPr id="14" name="TextBox 13"/>
+          <p:cNvSpPr txBox="1"/>
+          <p:nvPr/>
+        </p:nvSpPr>
+        <p:spPr>
+          <a:xfrm>
+            <a:off x="914400" y="5105400"/>
+            <a:ext cx="5480796" cy="923330"/>
+          </a:xfrm>
+          <a:prstGeom prst="rect">
+            <a:avLst/>
+          </a:prstGeom>
+          <a:noFill/>
+        </p:spPr>
+        <p:txBody>
+          <a:bodyPr wrap="none" rtlCol="0">
+            <a:spAutoFit/>
+          </a:bodyPr>
+          <a:lstStyle/>
+          <a:p>
+            <a:r>
+              <a:rPr lang="en-US" dirty="0" smtClean="0"/>
+              <a:t>Moving the crossing point to the right is good for</a:t>
+            </a:r>
+            <a:br>
+              <a:rPr lang="en-US" dirty="0" smtClean="0"/>
+            </a:br>
+            <a:r>
+              <a:rPr lang="en-US" dirty="0" smtClean="0"/>
+              <a:t>open science.  Can do this by increasing payoff for open</a:t>
+            </a:r>
+            <a:br>
+              <a:rPr lang="en-US" dirty="0" smtClean="0"/>
+            </a:br>
+            <a:r>
+              <a:rPr lang="en-US" dirty="0" smtClean="0"/>
+              <a:t>science, reducing temptation to D, or many other things.</a:t>
+            </a:r>
+          </a:p>
+        </p:txBody>
+      </p:sp>
+    </p:spTree>
+  </p:cSld>
+  <p:clrMapOvr>
+    <a:masterClrMapping/>
+  </p:clrMapOvr>
+</p:sld>
+</file>
+
+<file path=ppt/slides/slide5.xml><?xml version="1.0" encoding="utf-8"?>
+<p:sld xmlns:a="http://schemas.openxmlformats.org/drawingml/2006/main" xmlns:r="http://schemas.openxmlformats.org/officeDocument/2006/relationships" xmlns:p="http://schemas.openxmlformats.org/presentationml/2006/main">
+  <p:cSld>
+    <p:spTree>
+      <p:nvGrpSpPr>
+        <p:cNvPr id="1" name=""/>
+        <p:cNvGrpSpPr/>
+        <p:nvPr/>
+      </p:nvGrpSpPr>
+      <p:grpSpPr>
+        <a:xfrm>
+          <a:off x="0" y="0"/>
+          <a:ext cx="0" cy="0"/>
+          <a:chOff x="0" y="0"/>
+          <a:chExt cx="0" cy="0"/>
+        </a:xfrm>
+      </p:grpSpPr>
+      <p:pic>
+        <p:nvPicPr>
+          <p:cNvPr id="2" name="Picture 1" descr="Payoff vs Mu.png"/>
+          <p:cNvPicPr>
+            <a:picLocks noChangeAspect="1"/>
+          </p:cNvPicPr>
+          <p:nvPr/>
+        </p:nvPicPr>
+        <p:blipFill>
+          <a:blip r:embed="rId2" cstate="print"/>
+          <a:stretch>
+            <a:fillRect/>
+          </a:stretch>
+        </p:blipFill>
+        <p:spPr>
+          <a:xfrm>
+            <a:off x="914702" y="686026"/>
+            <a:ext cx="7314596" cy="5485947"/>
+          </a:xfrm>
+          <a:prstGeom prst="rect">
+            <a:avLst/>
+          </a:prstGeom>
+        </p:spPr>
+      </p:pic>
+    </p:spTree>
   </p:cSld>
   <p:clrMapOvr>
     <a:masterClrMapping/>

</xml_diff>

<commit_message>
mostly done with theory part, now working on analysis
</commit_message>
<xml_diff>
--- a/gametheoryfigures.pptx
+++ b/gametheoryfigures.pptx
@@ -10,6 +10,10 @@
     <p:sldId id="257" r:id="rId4"/>
     <p:sldId id="258" r:id="rId5"/>
     <p:sldId id="259" r:id="rId6"/>
+    <p:sldId id="261" r:id="rId7"/>
+    <p:sldId id="262" r:id="rId8"/>
+    <p:sldId id="263" r:id="rId9"/>
+    <p:sldId id="264" r:id="rId10"/>
   </p:sldIdLst>
   <p:sldSz cx="9144000" cy="6858000" type="screen4x3"/>
   <p:notesSz cx="6858000" cy="9144000"/>
@@ -293,7 +297,7 @@
             <a:fld id="{3E8967D4-FF48-447B-9DB9-858742D691FC}" type="datetimeFigureOut">
               <a:rPr lang="en-US" smtClean="0"/>
               <a:pPr/>
-              <a:t>12/9/2011</a:t>
+              <a:t>5/14/2012</a:t>
             </a:fld>
             <a:endParaRPr lang="en-US"/>
           </a:p>
@@ -345,7 +349,7 @@
     </p:spTree>
     <p:extLst>
       <p:ext uri="{BB962C8B-B14F-4D97-AF65-F5344CB8AC3E}">
-        <p14:creationId xmlns:p14="http://schemas.microsoft.com/office/powerpoint/2010/main" xmlns="" val="2607822030"/>
+        <p14:creationId xmlns:p14="http://schemas.microsoft.com/office/powerpoint/2010/main" val="2607822030"/>
       </p:ext>
     </p:extLst>
   </p:cSld>
@@ -465,7 +469,7 @@
             <a:fld id="{3E8967D4-FF48-447B-9DB9-858742D691FC}" type="datetimeFigureOut">
               <a:rPr lang="en-US" smtClean="0"/>
               <a:pPr/>
-              <a:t>12/9/2011</a:t>
+              <a:t>5/14/2012</a:t>
             </a:fld>
             <a:endParaRPr lang="en-US"/>
           </a:p>
@@ -517,7 +521,7 @@
     </p:spTree>
     <p:extLst>
       <p:ext uri="{BB962C8B-B14F-4D97-AF65-F5344CB8AC3E}">
-        <p14:creationId xmlns:p14="http://schemas.microsoft.com/office/powerpoint/2010/main" xmlns="" val="1851855191"/>
+        <p14:creationId xmlns:p14="http://schemas.microsoft.com/office/powerpoint/2010/main" val="1851855191"/>
       </p:ext>
     </p:extLst>
   </p:cSld>
@@ -647,7 +651,7 @@
             <a:fld id="{3E8967D4-FF48-447B-9DB9-858742D691FC}" type="datetimeFigureOut">
               <a:rPr lang="en-US" smtClean="0"/>
               <a:pPr/>
-              <a:t>12/9/2011</a:t>
+              <a:t>5/14/2012</a:t>
             </a:fld>
             <a:endParaRPr lang="en-US"/>
           </a:p>
@@ -699,7 +703,7 @@
     </p:spTree>
     <p:extLst>
       <p:ext uri="{BB962C8B-B14F-4D97-AF65-F5344CB8AC3E}">
-        <p14:creationId xmlns:p14="http://schemas.microsoft.com/office/powerpoint/2010/main" xmlns="" val="4179941889"/>
+        <p14:creationId xmlns:p14="http://schemas.microsoft.com/office/powerpoint/2010/main" val="4179941889"/>
       </p:ext>
     </p:extLst>
   </p:cSld>
@@ -819,7 +823,7 @@
             <a:fld id="{3E8967D4-FF48-447B-9DB9-858742D691FC}" type="datetimeFigureOut">
               <a:rPr lang="en-US" smtClean="0"/>
               <a:pPr/>
-              <a:t>12/9/2011</a:t>
+              <a:t>5/14/2012</a:t>
             </a:fld>
             <a:endParaRPr lang="en-US"/>
           </a:p>
@@ -871,7 +875,7 @@
     </p:spTree>
     <p:extLst>
       <p:ext uri="{BB962C8B-B14F-4D97-AF65-F5344CB8AC3E}">
-        <p14:creationId xmlns:p14="http://schemas.microsoft.com/office/powerpoint/2010/main" xmlns="" val="1851933190"/>
+        <p14:creationId xmlns:p14="http://schemas.microsoft.com/office/powerpoint/2010/main" val="1851933190"/>
       </p:ext>
     </p:extLst>
   </p:cSld>
@@ -1067,7 +1071,7 @@
             <a:fld id="{3E8967D4-FF48-447B-9DB9-858742D691FC}" type="datetimeFigureOut">
               <a:rPr lang="en-US" smtClean="0"/>
               <a:pPr/>
-              <a:t>12/9/2011</a:t>
+              <a:t>5/14/2012</a:t>
             </a:fld>
             <a:endParaRPr lang="en-US"/>
           </a:p>
@@ -1119,7 +1123,7 @@
     </p:spTree>
     <p:extLst>
       <p:ext uri="{BB962C8B-B14F-4D97-AF65-F5344CB8AC3E}">
-        <p14:creationId xmlns:p14="http://schemas.microsoft.com/office/powerpoint/2010/main" xmlns="" val="3300295364"/>
+        <p14:creationId xmlns:p14="http://schemas.microsoft.com/office/powerpoint/2010/main" val="3300295364"/>
       </p:ext>
     </p:extLst>
   </p:cSld>
@@ -1357,7 +1361,7 @@
             <a:fld id="{3E8967D4-FF48-447B-9DB9-858742D691FC}" type="datetimeFigureOut">
               <a:rPr lang="en-US" smtClean="0"/>
               <a:pPr/>
-              <a:t>12/9/2011</a:t>
+              <a:t>5/14/2012</a:t>
             </a:fld>
             <a:endParaRPr lang="en-US"/>
           </a:p>
@@ -1409,7 +1413,7 @@
     </p:spTree>
     <p:extLst>
       <p:ext uri="{BB962C8B-B14F-4D97-AF65-F5344CB8AC3E}">
-        <p14:creationId xmlns:p14="http://schemas.microsoft.com/office/powerpoint/2010/main" xmlns="" val="3471764114"/>
+        <p14:creationId xmlns:p14="http://schemas.microsoft.com/office/powerpoint/2010/main" val="3471764114"/>
       </p:ext>
     </p:extLst>
   </p:cSld>
@@ -1781,7 +1785,7 @@
             <a:fld id="{3E8967D4-FF48-447B-9DB9-858742D691FC}" type="datetimeFigureOut">
               <a:rPr lang="en-US" smtClean="0"/>
               <a:pPr/>
-              <a:t>12/9/2011</a:t>
+              <a:t>5/14/2012</a:t>
             </a:fld>
             <a:endParaRPr lang="en-US"/>
           </a:p>
@@ -1833,7 +1837,7 @@
     </p:spTree>
     <p:extLst>
       <p:ext uri="{BB962C8B-B14F-4D97-AF65-F5344CB8AC3E}">
-        <p14:creationId xmlns:p14="http://schemas.microsoft.com/office/powerpoint/2010/main" xmlns="" val="3467884311"/>
+        <p14:creationId xmlns:p14="http://schemas.microsoft.com/office/powerpoint/2010/main" val="3467884311"/>
       </p:ext>
     </p:extLst>
   </p:cSld>
@@ -1901,7 +1905,7 @@
             <a:fld id="{3E8967D4-FF48-447B-9DB9-858742D691FC}" type="datetimeFigureOut">
               <a:rPr lang="en-US" smtClean="0"/>
               <a:pPr/>
-              <a:t>12/9/2011</a:t>
+              <a:t>5/14/2012</a:t>
             </a:fld>
             <a:endParaRPr lang="en-US"/>
           </a:p>
@@ -1953,7 +1957,7 @@
     </p:spTree>
     <p:extLst>
       <p:ext uri="{BB962C8B-B14F-4D97-AF65-F5344CB8AC3E}">
-        <p14:creationId xmlns:p14="http://schemas.microsoft.com/office/powerpoint/2010/main" xmlns="" val="1781745951"/>
+        <p14:creationId xmlns:p14="http://schemas.microsoft.com/office/powerpoint/2010/main" val="1781745951"/>
       </p:ext>
     </p:extLst>
   </p:cSld>
@@ -1998,7 +2002,7 @@
             <a:fld id="{3E8967D4-FF48-447B-9DB9-858742D691FC}" type="datetimeFigureOut">
               <a:rPr lang="en-US" smtClean="0"/>
               <a:pPr/>
-              <a:t>12/9/2011</a:t>
+              <a:t>5/14/2012</a:t>
             </a:fld>
             <a:endParaRPr lang="en-US"/>
           </a:p>
@@ -2050,7 +2054,7 @@
     </p:spTree>
     <p:extLst>
       <p:ext uri="{BB962C8B-B14F-4D97-AF65-F5344CB8AC3E}">
-        <p14:creationId xmlns:p14="http://schemas.microsoft.com/office/powerpoint/2010/main" xmlns="" val="674480359"/>
+        <p14:creationId xmlns:p14="http://schemas.microsoft.com/office/powerpoint/2010/main" val="674480359"/>
       </p:ext>
     </p:extLst>
   </p:cSld>
@@ -2277,7 +2281,7 @@
             <a:fld id="{3E8967D4-FF48-447B-9DB9-858742D691FC}" type="datetimeFigureOut">
               <a:rPr lang="en-US" smtClean="0"/>
               <a:pPr/>
-              <a:t>12/9/2011</a:t>
+              <a:t>5/14/2012</a:t>
             </a:fld>
             <a:endParaRPr lang="en-US"/>
           </a:p>
@@ -2329,7 +2333,7 @@
     </p:spTree>
     <p:extLst>
       <p:ext uri="{BB962C8B-B14F-4D97-AF65-F5344CB8AC3E}">
-        <p14:creationId xmlns:p14="http://schemas.microsoft.com/office/powerpoint/2010/main" xmlns="" val="1359046856"/>
+        <p14:creationId xmlns:p14="http://schemas.microsoft.com/office/powerpoint/2010/main" val="1359046856"/>
       </p:ext>
     </p:extLst>
   </p:cSld>
@@ -2532,7 +2536,7 @@
             <a:fld id="{3E8967D4-FF48-447B-9DB9-858742D691FC}" type="datetimeFigureOut">
               <a:rPr lang="en-US" smtClean="0"/>
               <a:pPr/>
-              <a:t>12/9/2011</a:t>
+              <a:t>5/14/2012</a:t>
             </a:fld>
             <a:endParaRPr lang="en-US"/>
           </a:p>
@@ -2584,7 +2588,7 @@
     </p:spTree>
     <p:extLst>
       <p:ext uri="{BB962C8B-B14F-4D97-AF65-F5344CB8AC3E}">
-        <p14:creationId xmlns:p14="http://schemas.microsoft.com/office/powerpoint/2010/main" xmlns="" val="3492202625"/>
+        <p14:creationId xmlns:p14="http://schemas.microsoft.com/office/powerpoint/2010/main" val="3492202625"/>
       </p:ext>
     </p:extLst>
   </p:cSld>
@@ -2747,7 +2751,7 @@
             <a:fld id="{3E8967D4-FF48-447B-9DB9-858742D691FC}" type="datetimeFigureOut">
               <a:rPr lang="en-US" smtClean="0"/>
               <a:pPr/>
-              <a:t>12/9/2011</a:t>
+              <a:t>5/14/2012</a:t>
             </a:fld>
             <a:endParaRPr lang="en-US"/>
           </a:p>
@@ -2835,7 +2839,7 @@
     </p:spTree>
     <p:extLst>
       <p:ext uri="{BB962C8B-B14F-4D97-AF65-F5344CB8AC3E}">
-        <p14:creationId xmlns:p14="http://schemas.microsoft.com/office/powerpoint/2010/main" xmlns="" val="2239059231"/>
+        <p14:creationId xmlns:p14="http://schemas.microsoft.com/office/powerpoint/2010/main" val="2239059231"/>
       </p:ext>
     </p:extLst>
   </p:cSld>
@@ -4010,7 +4014,7 @@
     </p:spTree>
     <p:extLst>
       <p:ext uri="{BB962C8B-B14F-4D97-AF65-F5344CB8AC3E}">
-        <p14:creationId xmlns:p14="http://schemas.microsoft.com/office/powerpoint/2010/main" xmlns="" val="2945018409"/>
+        <p14:creationId xmlns:p14="http://schemas.microsoft.com/office/powerpoint/2010/main" val="2945018409"/>
       </p:ext>
     </p:extLst>
   </p:cSld>
@@ -5039,7 +5043,7 @@
     </p:spTree>
     <p:extLst>
       <p:ext uri="{BB962C8B-B14F-4D97-AF65-F5344CB8AC3E}">
-        <p14:creationId xmlns:p14="http://schemas.microsoft.com/office/powerpoint/2010/main" xmlns="" val="2945018409"/>
+        <p14:creationId xmlns:p14="http://schemas.microsoft.com/office/powerpoint/2010/main" val="2945018409"/>
       </p:ext>
     </p:extLst>
   </p:cSld>
@@ -5107,7 +5111,7 @@
     </p:spTree>
     <p:extLst>
       <p:ext uri="{BB962C8B-B14F-4D97-AF65-F5344CB8AC3E}">
-        <p14:creationId xmlns:p14="http://schemas.microsoft.com/office/powerpoint/2010/main" xmlns="" val="2925061750"/>
+        <p14:creationId xmlns:p14="http://schemas.microsoft.com/office/powerpoint/2010/main" val="2925061750"/>
       </p:ext>
     </p:extLst>
   </p:cSld>
@@ -5240,8 +5244,8 @@
         </p:nvSpPr>
         <p:spPr>
           <a:xfrm>
-            <a:off x="1295400" y="3810000"/>
-            <a:ext cx="3255378" cy="1200329"/>
+            <a:off x="1051281" y="3817119"/>
+            <a:ext cx="3118354" cy="923330"/>
           </a:xfrm>
           <a:prstGeom prst="rect">
             <a:avLst/>
@@ -5256,27 +5260,46 @@
           <a:p>
             <a:r>
               <a:rPr lang="en-US" dirty="0" smtClean="0"/>
-              <a:t>If frequency of open science</a:t>
+              <a:t>If frequency of </a:t>
+            </a:r>
+            <a:r>
+              <a:rPr lang="en-US" dirty="0" smtClean="0"/>
+              <a:t>cooperators is</a:t>
+            </a:r>
+            <a:r>
+              <a:rPr lang="en-US" dirty="0" smtClean="0"/>
+              <a:t/>
             </a:r>
             <a:br>
               <a:rPr lang="en-US" dirty="0" smtClean="0"/>
             </a:br>
             <a:r>
               <a:rPr lang="en-US" dirty="0" smtClean="0"/>
-              <a:t>cooperators high enough</a:t>
-            </a:r>
-          </a:p>
-          <a:p>
+              <a:t>high enough (low </a:t>
+            </a:r>
             <a:r>
               <a:rPr lang="en-US" dirty="0" smtClean="0"/>
-              <a:t>(low freq. defect.)</a:t>
+              <a:t>freq. defect.)</a:t>
             </a:r>
           </a:p>
           <a:p>
             <a:r>
               <a:rPr lang="en-US" dirty="0" smtClean="0"/>
-              <a:t>then Open Science (TFT) pays off</a:t>
-            </a:r>
+              <a:t>then </a:t>
+            </a:r>
+            <a:r>
+              <a:rPr lang="en-US" dirty="0" smtClean="0"/>
+              <a:t>cooperation (TFT</a:t>
+            </a:r>
+            <a:r>
+              <a:rPr lang="en-US" dirty="0" smtClean="0"/>
+              <a:t>) </a:t>
+            </a:r>
+            <a:r>
+              <a:rPr lang="en-US" dirty="0" smtClean="0"/>
+              <a:t>wins</a:t>
+            </a:r>
+            <a:endParaRPr lang="en-US" dirty="0" smtClean="0"/>
           </a:p>
         </p:txBody>
       </p:sp>
@@ -5359,7 +5382,7 @@
         <p:spPr>
           <a:xfrm>
             <a:off x="3581400" y="1981200"/>
-            <a:ext cx="2834622" cy="1200329"/>
+            <a:ext cx="2928622" cy="923330"/>
           </a:xfrm>
           <a:prstGeom prst="rect">
             <a:avLst/>
@@ -5374,237 +5397,43 @@
           <a:p>
             <a:r>
               <a:rPr lang="en-US" dirty="0" smtClean="0"/>
-              <a:t>If frequency of open science</a:t>
-            </a:r>
-            <a:br>
+              <a:t>If frequency </a:t>
+            </a:r>
+            <a:r>
               <a:rPr lang="en-US" dirty="0" smtClean="0"/>
-            </a:br>
+              <a:t>of cooperators is</a:t>
+            </a:r>
+          </a:p>
+          <a:p>
             <a:r>
               <a:rPr lang="en-US" dirty="0" smtClean="0"/>
-              <a:t>cooperators low</a:t>
-            </a:r>
-          </a:p>
-          <a:p>
+              <a:t>Low</a:t>
+            </a:r>
             <a:r>
               <a:rPr lang="en-US" dirty="0" smtClean="0"/>
-              <a:t>(high freq. defect.)</a:t>
-            </a:r>
-          </a:p>
-          <a:p>
+              <a:t> </a:t>
+            </a:r>
             <a:r>
               <a:rPr lang="en-US" dirty="0" smtClean="0"/>
-              <a:t>then closed science (D) wins</a:t>
-            </a:r>
-            <a:endParaRPr lang="en-US" dirty="0"/>
-          </a:p>
-        </p:txBody>
-      </p:sp>
-      <p:sp>
-        <p:nvSpPr>
-          <p:cNvPr id="13" name="TextBox 12"/>
-          <p:cNvSpPr txBox="1"/>
-          <p:nvPr/>
-        </p:nvSpPr>
-        <p:spPr>
-          <a:xfrm>
-            <a:off x="6654857" y="533400"/>
-            <a:ext cx="2489143" cy="5909310"/>
-          </a:xfrm>
-          <a:prstGeom prst="rect">
-            <a:avLst/>
-          </a:prstGeom>
-          <a:noFill/>
-        </p:spPr>
-        <p:txBody>
-          <a:bodyPr wrap="none" rtlCol="0">
-            <a:spAutoFit/>
-          </a:bodyPr>
-          <a:lstStyle/>
-          <a:p>
+              <a:t>(high </a:t>
+            </a:r>
             <a:r>
               <a:rPr lang="en-US" dirty="0" smtClean="0"/>
-              <a:t>Strategies:</a:t>
-            </a:r>
-          </a:p>
-          <a:p>
-            <a:r>
-              <a:rPr lang="en-US" dirty="0" smtClean="0">
-                <a:solidFill>
-                  <a:srgbClr val="C00000"/>
-                </a:solidFill>
-              </a:rPr>
-              <a:t>(1) D = defection,</a:t>
-            </a:r>
-          </a:p>
-          <a:p>
-            <a:r>
-              <a:rPr lang="en-US" dirty="0" smtClean="0">
-                <a:solidFill>
-                  <a:srgbClr val="C00000"/>
-                </a:solidFill>
-              </a:rPr>
-              <a:t>     closed science</a:t>
-            </a:r>
-          </a:p>
-          <a:p>
-            <a:endParaRPr lang="en-US" dirty="0" smtClean="0"/>
-          </a:p>
-          <a:p>
-            <a:r>
-              <a:rPr lang="en-US" dirty="0" smtClean="0">
-                <a:solidFill>
-                  <a:schemeClr val="tx2">
-                    <a:lumMod val="60000"/>
-                    <a:lumOff val="40000"/>
-                  </a:schemeClr>
-                </a:solidFill>
-              </a:rPr>
-              <a:t>(2) TFT = tit for tat,</a:t>
-            </a:r>
-            <a:br>
-              <a:rPr lang="en-US" dirty="0" smtClean="0">
-                <a:solidFill>
-                  <a:schemeClr val="tx2">
-                    <a:lumMod val="60000"/>
-                    <a:lumOff val="40000"/>
-                  </a:schemeClr>
-                </a:solidFill>
-              </a:rPr>
-            </a:br>
-            <a:r>
-              <a:rPr lang="en-US" dirty="0" smtClean="0">
-                <a:solidFill>
-                  <a:schemeClr val="tx2">
-                    <a:lumMod val="60000"/>
-                    <a:lumOff val="40000"/>
-                  </a:schemeClr>
-                </a:solidFill>
-              </a:rPr>
-              <a:t>     open science until</a:t>
-            </a:r>
-            <a:br>
-              <a:rPr lang="en-US" dirty="0" smtClean="0">
-                <a:solidFill>
-                  <a:schemeClr val="tx2">
-                    <a:lumMod val="60000"/>
-                    <a:lumOff val="40000"/>
-                  </a:schemeClr>
-                </a:solidFill>
-              </a:rPr>
-            </a:br>
-            <a:r>
-              <a:rPr lang="en-US" dirty="0" smtClean="0">
-                <a:solidFill>
-                  <a:schemeClr val="tx2">
-                    <a:lumMod val="60000"/>
-                    <a:lumOff val="40000"/>
-                  </a:schemeClr>
-                </a:solidFill>
-              </a:rPr>
-              <a:t>     burned by defector</a:t>
-            </a:r>
-          </a:p>
-          <a:p>
-            <a:endParaRPr lang="en-US" dirty="0" smtClean="0">
-              <a:solidFill>
-                <a:schemeClr val="tx2">
-                  <a:lumMod val="60000"/>
-                  <a:lumOff val="40000"/>
-                </a:schemeClr>
-              </a:solidFill>
-            </a:endParaRPr>
+              <a:t>freq. defect.)</a:t>
+            </a:r>
           </a:p>
           <a:p>
             <a:r>
               <a:rPr lang="en-US" dirty="0" smtClean="0"/>
-              <a:t>(SJK: I can’t remember</a:t>
-            </a:r>
-            <a:br>
+              <a:t>then </a:t>
+            </a:r>
+            <a:r>
               <a:rPr lang="en-US" dirty="0" smtClean="0"/>
-            </a:br>
+              <a:t>defectors (D</a:t>
+            </a:r>
             <a:r>
               <a:rPr lang="en-US" dirty="0" smtClean="0"/>
-              <a:t>what temptation refers</a:t>
-            </a:r>
-          </a:p>
-          <a:p>
-            <a:r>
-              <a:rPr lang="en-US" dirty="0" smtClean="0"/>
-              <a:t>to)</a:t>
-            </a:r>
-          </a:p>
-          <a:p>
-            <a:endParaRPr lang="en-US" dirty="0" smtClean="0"/>
-          </a:p>
-          <a:p>
-            <a:r>
-              <a:rPr lang="en-US" dirty="0" smtClean="0"/>
-              <a:t>One take home message</a:t>
-            </a:r>
-            <a:br>
-              <a:rPr lang="en-US" dirty="0" smtClean="0"/>
-            </a:br>
-            <a:r>
-              <a:rPr lang="en-US" dirty="0" smtClean="0"/>
-              <a:t>Even with TFT, open </a:t>
-            </a:r>
-          </a:p>
-          <a:p>
-            <a:r>
-              <a:rPr lang="en-US" dirty="0" smtClean="0"/>
-              <a:t>science reaches tipping</a:t>
-            </a:r>
-            <a:br>
-              <a:rPr lang="en-US" dirty="0" smtClean="0"/>
-            </a:br>
-            <a:r>
-              <a:rPr lang="en-US" dirty="0" smtClean="0"/>
-              <a:t>point with enough </a:t>
-            </a:r>
-            <a:br>
-              <a:rPr lang="en-US" dirty="0" smtClean="0"/>
-            </a:br>
-            <a:r>
-              <a:rPr lang="en-US" dirty="0" smtClean="0"/>
-              <a:t>participation</a:t>
-            </a:r>
-          </a:p>
-          <a:p>
-            <a:endParaRPr lang="en-US" dirty="0" smtClean="0"/>
-          </a:p>
-          <a:p>
-            <a:r>
-              <a:rPr lang="en-US" dirty="0" smtClean="0"/>
-              <a:t>Figures by Rob Olendorf</a:t>
-            </a:r>
-            <a:br>
-              <a:rPr lang="en-US" dirty="0" smtClean="0"/>
-            </a:br>
-            <a:r>
-              <a:rPr lang="en-US" dirty="0" smtClean="0"/>
-              <a:t>see </a:t>
-            </a:r>
-            <a:r>
-              <a:rPr lang="en-US" dirty="0" err="1" smtClean="0"/>
-              <a:t>github</a:t>
-            </a:r>
-            <a:r>
-              <a:rPr lang="en-US" dirty="0" smtClean="0"/>
-              <a:t>/</a:t>
-            </a:r>
-            <a:r>
-              <a:rPr lang="en-US" dirty="0" err="1" smtClean="0"/>
-              <a:t>olendorf</a:t>
-            </a:r>
-            <a:r>
-              <a:rPr lang="en-US" dirty="0" smtClean="0"/>
-              <a:t>/</a:t>
-            </a:r>
-          </a:p>
-          <a:p>
-            <a:r>
-              <a:rPr lang="en-US" dirty="0" err="1" smtClean="0"/>
-              <a:t>gametheoryopenscience</a:t>
+              <a:t>) wins</a:t>
             </a:r>
             <a:endParaRPr lang="en-US" dirty="0"/>
           </a:p>
@@ -5695,7 +5524,97 @@
         <p:spPr>
           <a:xfrm>
             <a:off x="914702" y="686026"/>
-            <a:ext cx="7314596" cy="5485947"/>
+            <a:ext cx="6781498" cy="5485947"/>
+          </a:xfrm>
+          <a:prstGeom prst="rect">
+            <a:avLst/>
+          </a:prstGeom>
+        </p:spPr>
+      </p:pic>
+      <p:sp>
+        <p:nvSpPr>
+          <p:cNvPr id="3" name="TextBox 2"/>
+          <p:cNvSpPr txBox="1"/>
+          <p:nvPr/>
+        </p:nvSpPr>
+        <p:spPr>
+          <a:xfrm>
+            <a:off x="2057400" y="4572000"/>
+            <a:ext cx="2998385" cy="523220"/>
+          </a:xfrm>
+          <a:prstGeom prst="rect">
+            <a:avLst/>
+          </a:prstGeom>
+          <a:noFill/>
+        </p:spPr>
+        <p:txBody>
+          <a:bodyPr wrap="none" rtlCol="0">
+            <a:spAutoFit/>
+          </a:bodyPr>
+          <a:lstStyle/>
+          <a:p>
+            <a:r>
+              <a:rPr lang="en-US" sz="1400" dirty="0" smtClean="0"/>
+              <a:t>As the length of interactions increases</a:t>
+            </a:r>
+          </a:p>
+          <a:p>
+            <a:r>
+              <a:rPr lang="en-US" sz="1400" dirty="0" smtClean="0"/>
+              <a:t>the critical point moves in favor of TFT.</a:t>
+            </a:r>
+          </a:p>
+        </p:txBody>
+      </p:sp>
+    </p:spTree>
+  </p:cSld>
+  <p:clrMapOvr>
+    <a:masterClrMapping/>
+  </p:clrMapOvr>
+</p:sld>
+</file>
+
+<file path=ppt/slides/slide6.xml><?xml version="1.0" encoding="utf-8"?>
+<p:sld xmlns:a="http://schemas.openxmlformats.org/drawingml/2006/main" xmlns:r="http://schemas.openxmlformats.org/officeDocument/2006/relationships" xmlns:p="http://schemas.openxmlformats.org/presentationml/2006/main">
+  <p:cSld>
+    <p:spTree>
+      <p:nvGrpSpPr>
+        <p:cNvPr id="1" name=""/>
+        <p:cNvGrpSpPr/>
+        <p:nvPr/>
+      </p:nvGrpSpPr>
+      <p:grpSpPr>
+        <a:xfrm>
+          <a:off x="0" y="0"/>
+          <a:ext cx="0" cy="0"/>
+          <a:chOff x="0" y="0"/>
+          <a:chExt cx="0" cy="0"/>
+        </a:xfrm>
+      </p:grpSpPr>
+      <p:pic>
+        <p:nvPicPr>
+          <p:cNvPr id="2" name="Picture 1"/>
+          <p:cNvPicPr>
+            <a:picLocks noChangeAspect="1"/>
+          </p:cNvPicPr>
+          <p:nvPr/>
+        </p:nvPicPr>
+        <p:blipFill>
+          <a:blip r:embed="rId2">
+            <a:extLst>
+              <a:ext uri="{28A0092B-C50C-407E-A947-70E740481C1C}">
+                <a14:useLocalDpi xmlns:a14="http://schemas.microsoft.com/office/drawing/2010/main" val="0"/>
+              </a:ext>
+            </a:extLst>
+          </a:blip>
+          <a:stretch>
+            <a:fillRect/>
+          </a:stretch>
+        </p:blipFill>
+        <p:spPr>
+          <a:xfrm>
+            <a:off x="1905333" y="1429000"/>
+            <a:ext cx="5333334" cy="4000000"/>
           </a:xfrm>
           <a:prstGeom prst="rect">
             <a:avLst/>
@@ -5703,6 +5622,410 @@
         </p:spPr>
       </p:pic>
     </p:spTree>
+    <p:extLst>
+      <p:ext uri="{BB962C8B-B14F-4D97-AF65-F5344CB8AC3E}">
+        <p14:creationId xmlns:p14="http://schemas.microsoft.com/office/powerpoint/2010/main" val="1183672539"/>
+      </p:ext>
+    </p:extLst>
+  </p:cSld>
+  <p:clrMapOvr>
+    <a:masterClrMapping/>
+  </p:clrMapOvr>
+</p:sld>
+</file>
+
+<file path=ppt/slides/slide7.xml><?xml version="1.0" encoding="utf-8"?>
+<p:sld xmlns:a="http://schemas.openxmlformats.org/drawingml/2006/main" xmlns:r="http://schemas.openxmlformats.org/officeDocument/2006/relationships" xmlns:p="http://schemas.openxmlformats.org/presentationml/2006/main">
+  <p:cSld>
+    <p:spTree>
+      <p:nvGrpSpPr>
+        <p:cNvPr id="1" name=""/>
+        <p:cNvGrpSpPr/>
+        <p:nvPr/>
+      </p:nvGrpSpPr>
+      <p:grpSpPr>
+        <a:xfrm>
+          <a:off x="0" y="0"/>
+          <a:ext cx="0" cy="0"/>
+          <a:chOff x="0" y="0"/>
+          <a:chExt cx="0" cy="0"/>
+        </a:xfrm>
+      </p:grpSpPr>
+      <p:grpSp>
+        <p:nvGrpSpPr>
+          <p:cNvPr id="2" name="Group 1"/>
+          <p:cNvGrpSpPr/>
+          <p:nvPr/>
+        </p:nvGrpSpPr>
+        <p:grpSpPr>
+          <a:xfrm>
+            <a:off x="1447800" y="297832"/>
+            <a:ext cx="3429000" cy="3124199"/>
+            <a:chOff x="-76199" y="1"/>
+            <a:chExt cx="7315201" cy="6911789"/>
+          </a:xfrm>
+        </p:grpSpPr>
+        <p:pic>
+          <p:nvPicPr>
+            <p:cNvPr id="1026" name="Picture 2" descr="https://github.com/olendorf/gametheoryopenscience/blob/master/temptationtodefect.png?raw=true"/>
+            <p:cNvPicPr>
+              <a:picLocks noChangeAspect="1" noChangeArrowheads="1"/>
+            </p:cNvPicPr>
+            <p:nvPr/>
+          </p:nvPicPr>
+          <p:blipFill>
+            <a:blip r:embed="rId2" cstate="print"/>
+            <a:srcRect/>
+            <a:stretch>
+              <a:fillRect/>
+            </a:stretch>
+          </p:blipFill>
+          <p:spPr bwMode="auto">
+            <a:xfrm>
+              <a:off x="-76199" y="1"/>
+              <a:ext cx="7315201" cy="6911789"/>
+            </a:xfrm>
+            <a:prstGeom prst="rect">
+              <a:avLst/>
+            </a:prstGeom>
+            <a:noFill/>
+          </p:spPr>
+        </p:pic>
+        <p:cxnSp>
+          <p:nvCxnSpPr>
+            <p:cNvPr id="4" name="Straight Connector 3"/>
+            <p:cNvCxnSpPr>
+              <a:endCxn id="5" idx="1"/>
+            </p:cNvCxnSpPr>
+            <p:nvPr/>
+          </p:nvCxnSpPr>
+          <p:spPr>
+            <a:xfrm>
+              <a:off x="4648200" y="3886200"/>
+              <a:ext cx="0" cy="457200"/>
+            </a:xfrm>
+            <a:prstGeom prst="line">
+              <a:avLst/>
+            </a:prstGeom>
+          </p:spPr>
+          <p:style>
+            <a:lnRef idx="2">
+              <a:schemeClr val="dk1"/>
+            </a:lnRef>
+            <a:fillRef idx="0">
+              <a:schemeClr val="dk1"/>
+            </a:fillRef>
+            <a:effectRef idx="1">
+              <a:schemeClr val="dk1"/>
+            </a:effectRef>
+            <a:fontRef idx="minor">
+              <a:schemeClr val="tx1"/>
+            </a:fontRef>
+          </p:style>
+        </p:cxnSp>
+        <p:sp>
+          <p:nvSpPr>
+            <p:cNvPr id="5" name="Right Arrow 4"/>
+            <p:cNvSpPr/>
+            <p:nvPr/>
+          </p:nvSpPr>
+          <p:spPr>
+            <a:xfrm rot="10800000">
+              <a:off x="4191000" y="4191000"/>
+              <a:ext cx="457200" cy="304800"/>
+            </a:xfrm>
+            <a:prstGeom prst="rightArrow">
+              <a:avLst/>
+            </a:prstGeom>
+          </p:spPr>
+          <p:style>
+            <a:lnRef idx="2">
+              <a:schemeClr val="dk1">
+                <a:shade val="50000"/>
+              </a:schemeClr>
+            </a:lnRef>
+            <a:fillRef idx="1">
+              <a:schemeClr val="dk1"/>
+            </a:fillRef>
+            <a:effectRef idx="0">
+              <a:schemeClr val="dk1"/>
+            </a:effectRef>
+            <a:fontRef idx="minor">
+              <a:schemeClr val="lt1"/>
+            </a:fontRef>
+          </p:style>
+          <p:txBody>
+            <a:bodyPr rtlCol="0" anchor="ctr"/>
+            <a:lstStyle/>
+            <a:p>
+              <a:pPr algn="ctr"/>
+              <a:endParaRPr lang="en-US"/>
+            </a:p>
+          </p:txBody>
+        </p:sp>
+        <p:sp>
+          <p:nvSpPr>
+            <p:cNvPr id="6" name="TextBox 5"/>
+            <p:cNvSpPr txBox="1"/>
+            <p:nvPr/>
+          </p:nvSpPr>
+          <p:spPr>
+            <a:xfrm>
+              <a:off x="2524761" y="4064575"/>
+              <a:ext cx="1519049" cy="544724"/>
+            </a:xfrm>
+            <a:prstGeom prst="rect">
+              <a:avLst/>
+            </a:prstGeom>
+            <a:noFill/>
+          </p:spPr>
+          <p:txBody>
+            <a:bodyPr wrap="none" rtlCol="0">
+              <a:spAutoFit/>
+            </a:bodyPr>
+            <a:lstStyle/>
+            <a:p>
+              <a:r>
+                <a:rPr lang="en-US" sz="1000" dirty="0" smtClean="0"/>
+                <a:t>(TFT</a:t>
+              </a:r>
+              <a:r>
+                <a:rPr lang="en-US" sz="1000" dirty="0" smtClean="0"/>
+                <a:t>) </a:t>
+              </a:r>
+              <a:r>
+                <a:rPr lang="en-US" sz="1000" dirty="0" smtClean="0"/>
+                <a:t>wins</a:t>
+              </a:r>
+              <a:endParaRPr lang="en-US" sz="1000" dirty="0" smtClean="0"/>
+            </a:p>
+          </p:txBody>
+        </p:sp>
+        <p:cxnSp>
+          <p:nvCxnSpPr>
+            <p:cNvPr id="7" name="Straight Connector 6"/>
+            <p:cNvCxnSpPr/>
+            <p:nvPr/>
+          </p:nvCxnSpPr>
+          <p:spPr>
+            <a:xfrm>
+              <a:off x="4648200" y="3276600"/>
+              <a:ext cx="0" cy="609600"/>
+            </a:xfrm>
+            <a:prstGeom prst="line">
+              <a:avLst/>
+            </a:prstGeom>
+          </p:spPr>
+          <p:style>
+            <a:lnRef idx="2">
+              <a:schemeClr val="dk1"/>
+            </a:lnRef>
+            <a:fillRef idx="0">
+              <a:schemeClr val="dk1"/>
+            </a:fillRef>
+            <a:effectRef idx="1">
+              <a:schemeClr val="dk1"/>
+            </a:effectRef>
+            <a:fontRef idx="minor">
+              <a:schemeClr val="tx1"/>
+            </a:fontRef>
+          </p:style>
+        </p:cxnSp>
+        <p:sp>
+          <p:nvSpPr>
+            <p:cNvPr id="8" name="Right Arrow 7"/>
+            <p:cNvSpPr/>
+            <p:nvPr/>
+          </p:nvSpPr>
+          <p:spPr>
+            <a:xfrm>
+              <a:off x="4648200" y="3200400"/>
+              <a:ext cx="457200" cy="304800"/>
+            </a:xfrm>
+            <a:prstGeom prst="rightArrow">
+              <a:avLst/>
+            </a:prstGeom>
+          </p:spPr>
+          <p:style>
+            <a:lnRef idx="2">
+              <a:schemeClr val="dk1">
+                <a:shade val="50000"/>
+              </a:schemeClr>
+            </a:lnRef>
+            <a:fillRef idx="1">
+              <a:schemeClr val="dk1"/>
+            </a:fillRef>
+            <a:effectRef idx="0">
+              <a:schemeClr val="dk1"/>
+            </a:effectRef>
+            <a:fontRef idx="minor">
+              <a:schemeClr val="lt1"/>
+            </a:fontRef>
+          </p:style>
+          <p:txBody>
+            <a:bodyPr rtlCol="0" anchor="ctr"/>
+            <a:lstStyle/>
+            <a:p>
+              <a:pPr algn="ctr"/>
+              <a:endParaRPr lang="en-US"/>
+            </a:p>
+          </p:txBody>
+        </p:sp>
+        <p:sp>
+          <p:nvSpPr>
+            <p:cNvPr id="11" name="TextBox 10"/>
+            <p:cNvSpPr txBox="1"/>
+            <p:nvPr/>
+          </p:nvSpPr>
+          <p:spPr>
+            <a:xfrm>
+              <a:off x="5105400" y="3025344"/>
+              <a:ext cx="1293346" cy="544724"/>
+            </a:xfrm>
+            <a:prstGeom prst="rect">
+              <a:avLst/>
+            </a:prstGeom>
+            <a:noFill/>
+          </p:spPr>
+          <p:txBody>
+            <a:bodyPr wrap="none" rtlCol="0">
+              <a:spAutoFit/>
+            </a:bodyPr>
+            <a:lstStyle/>
+            <a:p>
+              <a:r>
+                <a:rPr lang="en-US" sz="1000" dirty="0" smtClean="0"/>
+                <a:t>(D</a:t>
+              </a:r>
+              <a:r>
+                <a:rPr lang="en-US" sz="1000" dirty="0" smtClean="0"/>
+                <a:t>) wins</a:t>
+              </a:r>
+              <a:endParaRPr lang="en-US" sz="1000" dirty="0"/>
+            </a:p>
+          </p:txBody>
+        </p:sp>
+      </p:grpSp>
+    </p:spTree>
+    <p:extLst>
+      <p:ext uri="{BB962C8B-B14F-4D97-AF65-F5344CB8AC3E}">
+        <p14:creationId xmlns:p14="http://schemas.microsoft.com/office/powerpoint/2010/main" val="4043382542"/>
+      </p:ext>
+    </p:extLst>
+  </p:cSld>
+  <p:clrMapOvr>
+    <a:masterClrMapping/>
+  </p:clrMapOvr>
+</p:sld>
+</file>
+
+<file path=ppt/slides/slide8.xml><?xml version="1.0" encoding="utf-8"?>
+<p:sld xmlns:a="http://schemas.openxmlformats.org/drawingml/2006/main" xmlns:r="http://schemas.openxmlformats.org/officeDocument/2006/relationships" xmlns:p="http://schemas.openxmlformats.org/presentationml/2006/main">
+  <p:cSld>
+    <p:spTree>
+      <p:nvGrpSpPr>
+        <p:cNvPr id="1" name=""/>
+        <p:cNvGrpSpPr/>
+        <p:nvPr/>
+      </p:nvGrpSpPr>
+      <p:grpSpPr>
+        <a:xfrm>
+          <a:off x="0" y="0"/>
+          <a:ext cx="0" cy="0"/>
+          <a:chOff x="0" y="0"/>
+          <a:chExt cx="0" cy="0"/>
+        </a:xfrm>
+      </p:grpSpPr>
+      <p:pic>
+        <p:nvPicPr>
+          <p:cNvPr id="2" name="Picture 1" descr="Payoff vs Mu.png"/>
+          <p:cNvPicPr>
+            <a:picLocks noChangeAspect="1"/>
+          </p:cNvPicPr>
+          <p:nvPr/>
+        </p:nvPicPr>
+        <p:blipFill>
+          <a:blip r:embed="rId2" cstate="print"/>
+          <a:stretch>
+            <a:fillRect/>
+          </a:stretch>
+        </p:blipFill>
+        <p:spPr>
+          <a:xfrm>
+            <a:off x="609600" y="381001"/>
+            <a:ext cx="3581400" cy="2897202"/>
+          </a:xfrm>
+          <a:prstGeom prst="rect">
+            <a:avLst/>
+          </a:prstGeom>
+        </p:spPr>
+      </p:pic>
+    </p:spTree>
+    <p:extLst>
+      <p:ext uri="{BB962C8B-B14F-4D97-AF65-F5344CB8AC3E}">
+        <p14:creationId xmlns:p14="http://schemas.microsoft.com/office/powerpoint/2010/main" val="767976118"/>
+      </p:ext>
+    </p:extLst>
+  </p:cSld>
+  <p:clrMapOvr>
+    <a:masterClrMapping/>
+  </p:clrMapOvr>
+</p:sld>
+</file>
+
+<file path=ppt/slides/slide9.xml><?xml version="1.0" encoding="utf-8"?>
+<p:sld xmlns:a="http://schemas.openxmlformats.org/drawingml/2006/main" xmlns:r="http://schemas.openxmlformats.org/officeDocument/2006/relationships" xmlns:p="http://schemas.openxmlformats.org/presentationml/2006/main">
+  <p:cSld>
+    <p:spTree>
+      <p:nvGrpSpPr>
+        <p:cNvPr id="1" name=""/>
+        <p:cNvGrpSpPr/>
+        <p:nvPr/>
+      </p:nvGrpSpPr>
+      <p:grpSpPr>
+        <a:xfrm>
+          <a:off x="0" y="0"/>
+          <a:ext cx="0" cy="0"/>
+          <a:chOff x="0" y="0"/>
+          <a:chExt cx="0" cy="0"/>
+        </a:xfrm>
+      </p:grpSpPr>
+      <p:pic>
+        <p:nvPicPr>
+          <p:cNvPr id="2" name="Picture 1"/>
+          <p:cNvPicPr>
+            <a:picLocks noChangeAspect="1"/>
+          </p:cNvPicPr>
+          <p:nvPr/>
+        </p:nvPicPr>
+        <p:blipFill>
+          <a:blip r:embed="rId2">
+            <a:extLst>
+              <a:ext uri="{28A0092B-C50C-407E-A947-70E740481C1C}">
+                <a14:useLocalDpi xmlns:a14="http://schemas.microsoft.com/office/drawing/2010/main" val="0"/>
+              </a:ext>
+            </a:extLst>
+          </a:blip>
+          <a:stretch>
+            <a:fillRect/>
+          </a:stretch>
+        </p:blipFill>
+        <p:spPr>
+          <a:xfrm>
+            <a:off x="1905333" y="1429000"/>
+            <a:ext cx="3733467" cy="2800100"/>
+          </a:xfrm>
+          <a:prstGeom prst="rect">
+            <a:avLst/>
+          </a:prstGeom>
+        </p:spPr>
+      </p:pic>
+    </p:spTree>
+    <p:extLst>
+      <p:ext uri="{BB962C8B-B14F-4D97-AF65-F5344CB8AC3E}">
+        <p14:creationId xmlns:p14="http://schemas.microsoft.com/office/powerpoint/2010/main" val="816148622"/>
+      </p:ext>
+    </p:extLst>
   </p:cSld>
   <p:clrMapOvr>
     <a:masterClrMapping/>

</xml_diff>